<commit_message>
Initial update commit 2
</commit_message>
<xml_diff>
--- a/data/dsmc_report/tables_as_ppt/tables.pptx
+++ b/data/dsmc_report/tables_as_ppt/tables.pptx
@@ -1,14 +1,11 @@
 
 <file path=ppt/presentation.xml><?xml version="1.0" encoding="utf-8"?>
-<p:presentation xmlns:a="http://schemas.openxmlformats.org/drawingml/2006/main" xmlns:r="http://schemas.openxmlformats.org/officeDocument/2006/relationships" xmlns:p="http://schemas.openxmlformats.org/presentationml/2006/main" saveSubsetFonts="1" autoCompressPictures="0">
+<p:presentation xmlns:a="http://schemas.openxmlformats.org/drawingml/2006/main" xmlns:r="http://schemas.openxmlformats.org/officeDocument/2006/relationships" xmlns:p="http://schemas.openxmlformats.org/presentationml/2006/main" saveSubsetFonts="1">
   <p:sldMasterIdLst>
-    <p:sldMasterId id="2147483648" r:id="rId4"/>
+    <p:sldMasterId id="2147483648" r:id="rId1"/>
   </p:sldMasterIdLst>
-  <p:notesMasterIdLst>
-    <p:notesMasterId r:id="rId6"/>
-  </p:notesMasterIdLst>
   <p:sldIdLst>
-    <p:sldId id="256" r:id="rId5"/>
+    <p:sldId id="256" r:id="rId2"/>
   </p:sldIdLst>
   <p:sldSz cx="12192000" cy="6858000"/>
   <p:notesSz cx="6858000" cy="9144000"/>
@@ -107,379 +104,7 @@
       </a:defRPr>
     </a:lvl9pPr>
   </p:defaultTextStyle>
-  <p:extLst>
-    <p:ext uri="{EFAFB233-063F-42B5-8137-9DF3F51BA10A}">
-      <p15:sldGuideLst xmlns:p15="http://schemas.microsoft.com/office/powerpoint/2012/main"/>
-    </p:ext>
-  </p:extLst>
 </p:presentation>
-</file>
-
-<file path=ppt/authors.xml><?xml version="1.0" encoding="utf-8"?>
-<p188:authorLst xmlns:a="http://schemas.openxmlformats.org/drawingml/2006/main" xmlns:r="http://schemas.openxmlformats.org/officeDocument/2006/relationships" xmlns:p188="http://schemas.microsoft.com/office/powerpoint/2018/8/main">
-  <p188:author id="{EA17A36E-40FE-406D-EB70-152F22BC23AF}" name="Amanda Szabo-Reed" initials="ASR" userId="S::aszabo@kumc.edu::138cad0d-cb36-474b-8e0b-9dcfd8350eeb" providerId="AD"/>
-</p188:authorLst>
-</file>
-
-<file path=ppt/commentAuthors.xml><?xml version="1.0" encoding="utf-8"?>
-<p:cmAuthorLst xmlns:a="http://schemas.openxmlformats.org/drawingml/2006/main" xmlns:r="http://schemas.openxmlformats.org/officeDocument/2006/relationships" xmlns:p="http://schemas.openxmlformats.org/presentationml/2006/main">
-  <p:cmAuthor id="1" name="Amanda Szabo-Reed" initials="ASR" lastIdx="2" clrIdx="0">
-    <p:extLst>
-      <p:ext uri="{19B8F6BF-5375-455C-9EA6-DF929625EA0E}">
-        <p15:presenceInfo xmlns:p15="http://schemas.microsoft.com/office/powerpoint/2012/main" userId="S::aszabo@kumc.edu::138cad0d-cb36-474b-8e0b-9dcfd8350eeb" providerId="AD"/>
-      </p:ext>
-    </p:extLst>
-  </p:cmAuthor>
-</p:cmAuthorLst>
-</file>
-
-<file path=ppt/notesMasters/notesMaster1.xml><?xml version="1.0" encoding="utf-8"?>
-<p:notesMaster xmlns:a="http://schemas.openxmlformats.org/drawingml/2006/main" xmlns:r="http://schemas.openxmlformats.org/officeDocument/2006/relationships" xmlns:p="http://schemas.openxmlformats.org/presentationml/2006/main">
-  <p:cSld>
-    <p:bg>
-      <p:bgRef idx="1001">
-        <a:schemeClr val="bg1"/>
-      </p:bgRef>
-    </p:bg>
-    <p:spTree>
-      <p:nvGrpSpPr>
-        <p:cNvPr id="1" name=""/>
-        <p:cNvGrpSpPr/>
-        <p:nvPr/>
-      </p:nvGrpSpPr>
-      <p:grpSpPr>
-        <a:xfrm>
-          <a:off x="0" y="0"/>
-          <a:ext cx="0" cy="0"/>
-          <a:chOff x="0" y="0"/>
-          <a:chExt cx="0" cy="0"/>
-        </a:xfrm>
-      </p:grpSpPr>
-      <p:sp>
-        <p:nvSpPr>
-          <p:cNvPr id="2" name="Header Placeholder 1"/>
-          <p:cNvSpPr>
-            <a:spLocks noGrp="1"/>
-          </p:cNvSpPr>
-          <p:nvPr>
-            <p:ph type="hdr" sz="quarter"/>
-          </p:nvPr>
-        </p:nvSpPr>
-        <p:spPr>
-          <a:xfrm>
-            <a:off x="0" y="0"/>
-            <a:ext cx="2971800" cy="458788"/>
-          </a:xfrm>
-          <a:prstGeom prst="rect">
-            <a:avLst/>
-          </a:prstGeom>
-        </p:spPr>
-        <p:txBody>
-          <a:bodyPr vert="horz" lIns="91440" tIns="45720" rIns="91440" bIns="45720" rtlCol="0"/>
-          <a:lstStyle>
-            <a:lvl1pPr algn="l">
-              <a:defRPr sz="1200"/>
-            </a:lvl1pPr>
-          </a:lstStyle>
-          <a:p>
-            <a:endParaRPr lang="en-US"/>
-          </a:p>
-        </p:txBody>
-      </p:sp>
-      <p:sp>
-        <p:nvSpPr>
-          <p:cNvPr id="3" name="Date Placeholder 2"/>
-          <p:cNvSpPr>
-            <a:spLocks noGrp="1"/>
-          </p:cNvSpPr>
-          <p:nvPr>
-            <p:ph type="dt" idx="1"/>
-          </p:nvPr>
-        </p:nvSpPr>
-        <p:spPr>
-          <a:xfrm>
-            <a:off x="3884613" y="0"/>
-            <a:ext cx="2971800" cy="458788"/>
-          </a:xfrm>
-          <a:prstGeom prst="rect">
-            <a:avLst/>
-          </a:prstGeom>
-        </p:spPr>
-        <p:txBody>
-          <a:bodyPr vert="horz" lIns="91440" tIns="45720" rIns="91440" bIns="45720" rtlCol="0"/>
-          <a:lstStyle>
-            <a:lvl1pPr algn="r">
-              <a:defRPr sz="1200"/>
-            </a:lvl1pPr>
-          </a:lstStyle>
-          <a:p>
-            <a:fld id="{4E32F9CE-513B-9249-9B03-E77734626006}" type="datetimeFigureOut">
-              <a:rPr lang="en-US" smtClean="0"/>
-              <a:t>9/21/2023</a:t>
-            </a:fld>
-            <a:endParaRPr lang="en-US"/>
-          </a:p>
-        </p:txBody>
-      </p:sp>
-      <p:sp>
-        <p:nvSpPr>
-          <p:cNvPr id="4" name="Slide Image Placeholder 3"/>
-          <p:cNvSpPr>
-            <a:spLocks noGrp="1" noRot="1" noChangeAspect="1"/>
-          </p:cNvSpPr>
-          <p:nvPr>
-            <p:ph type="sldImg" idx="2"/>
-          </p:nvPr>
-        </p:nvSpPr>
-        <p:spPr>
-          <a:xfrm>
-            <a:off x="685800" y="1143000"/>
-            <a:ext cx="5486400" cy="3086100"/>
-          </a:xfrm>
-          <a:prstGeom prst="rect">
-            <a:avLst/>
-          </a:prstGeom>
-          <a:noFill/>
-          <a:ln w="12700">
-            <a:solidFill>
-              <a:prstClr val="black"/>
-            </a:solidFill>
-          </a:ln>
-        </p:spPr>
-        <p:txBody>
-          <a:bodyPr vert="horz" lIns="91440" tIns="45720" rIns="91440" bIns="45720" rtlCol="0" anchor="ctr"/>
-          <a:lstStyle/>
-          <a:p>
-            <a:endParaRPr lang="en-US"/>
-          </a:p>
-        </p:txBody>
-      </p:sp>
-      <p:sp>
-        <p:nvSpPr>
-          <p:cNvPr id="5" name="Notes Placeholder 4"/>
-          <p:cNvSpPr>
-            <a:spLocks noGrp="1"/>
-          </p:cNvSpPr>
-          <p:nvPr>
-            <p:ph type="body" sz="quarter" idx="3"/>
-          </p:nvPr>
-        </p:nvSpPr>
-        <p:spPr>
-          <a:xfrm>
-            <a:off x="685800" y="4400550"/>
-            <a:ext cx="5486400" cy="3600450"/>
-          </a:xfrm>
-          <a:prstGeom prst="rect">
-            <a:avLst/>
-          </a:prstGeom>
-        </p:spPr>
-        <p:txBody>
-          <a:bodyPr vert="horz" lIns="91440" tIns="45720" rIns="91440" bIns="45720" rtlCol="0"/>
-          <a:lstStyle/>
-          <a:p>
-            <a:pPr lvl="0"/>
-            <a:r>
-              <a:rPr lang="en-US"/>
-              <a:t>Click to edit Master text styles</a:t>
-            </a:r>
-          </a:p>
-          <a:p>
-            <a:pPr lvl="1"/>
-            <a:r>
-              <a:rPr lang="en-US"/>
-              <a:t>Second level</a:t>
-            </a:r>
-          </a:p>
-          <a:p>
-            <a:pPr lvl="2"/>
-            <a:r>
-              <a:rPr lang="en-US"/>
-              <a:t>Third level</a:t>
-            </a:r>
-          </a:p>
-          <a:p>
-            <a:pPr lvl="3"/>
-            <a:r>
-              <a:rPr lang="en-US"/>
-              <a:t>Fourth level</a:t>
-            </a:r>
-          </a:p>
-          <a:p>
-            <a:pPr lvl="4"/>
-            <a:r>
-              <a:rPr lang="en-US"/>
-              <a:t>Fifth level</a:t>
-            </a:r>
-          </a:p>
-        </p:txBody>
-      </p:sp>
-      <p:sp>
-        <p:nvSpPr>
-          <p:cNvPr id="6" name="Footer Placeholder 5"/>
-          <p:cNvSpPr>
-            <a:spLocks noGrp="1"/>
-          </p:cNvSpPr>
-          <p:nvPr>
-            <p:ph type="ftr" sz="quarter" idx="4"/>
-          </p:nvPr>
-        </p:nvSpPr>
-        <p:spPr>
-          <a:xfrm>
-            <a:off x="0" y="8685213"/>
-            <a:ext cx="2971800" cy="458787"/>
-          </a:xfrm>
-          <a:prstGeom prst="rect">
-            <a:avLst/>
-          </a:prstGeom>
-        </p:spPr>
-        <p:txBody>
-          <a:bodyPr vert="horz" lIns="91440" tIns="45720" rIns="91440" bIns="45720" rtlCol="0" anchor="b"/>
-          <a:lstStyle>
-            <a:lvl1pPr algn="l">
-              <a:defRPr sz="1200"/>
-            </a:lvl1pPr>
-          </a:lstStyle>
-          <a:p>
-            <a:endParaRPr lang="en-US"/>
-          </a:p>
-        </p:txBody>
-      </p:sp>
-      <p:sp>
-        <p:nvSpPr>
-          <p:cNvPr id="7" name="Slide Number Placeholder 6"/>
-          <p:cNvSpPr>
-            <a:spLocks noGrp="1"/>
-          </p:cNvSpPr>
-          <p:nvPr>
-            <p:ph type="sldNum" sz="quarter" idx="5"/>
-          </p:nvPr>
-        </p:nvSpPr>
-        <p:spPr>
-          <a:xfrm>
-            <a:off x="3884613" y="8685213"/>
-            <a:ext cx="2971800" cy="458787"/>
-          </a:xfrm>
-          <a:prstGeom prst="rect">
-            <a:avLst/>
-          </a:prstGeom>
-        </p:spPr>
-        <p:txBody>
-          <a:bodyPr vert="horz" lIns="91440" tIns="45720" rIns="91440" bIns="45720" rtlCol="0" anchor="b"/>
-          <a:lstStyle>
-            <a:lvl1pPr algn="r">
-              <a:defRPr sz="1200"/>
-            </a:lvl1pPr>
-          </a:lstStyle>
-          <a:p>
-            <a:fld id="{57175DCB-5ECE-AD4B-A413-2C2520638E5E}" type="slidenum">
-              <a:rPr lang="en-US" smtClean="0"/>
-              <a:t>‹#›</a:t>
-            </a:fld>
-            <a:endParaRPr lang="en-US"/>
-          </a:p>
-        </p:txBody>
-      </p:sp>
-    </p:spTree>
-    <p:extLst>
-      <p:ext uri="{BB962C8B-B14F-4D97-AF65-F5344CB8AC3E}">
-        <p14:creationId xmlns:p14="http://schemas.microsoft.com/office/powerpoint/2010/main" val="4099699245"/>
-      </p:ext>
-    </p:extLst>
-  </p:cSld>
-  <p:clrMap bg1="lt1" tx1="dk1" bg2="lt2" tx2="dk2" accent1="accent1" accent2="accent2" accent3="accent3" accent4="accent4" accent5="accent5" accent6="accent6" hlink="hlink" folHlink="folHlink"/>
-  <p:notesStyle>
-    <a:lvl1pPr marL="0" algn="l" defTabSz="914400" rtl="0" eaLnBrk="1" latinLnBrk="0" hangingPunct="1">
-      <a:defRPr sz="1200" kern="1200">
-        <a:solidFill>
-          <a:schemeClr val="tx1"/>
-        </a:solidFill>
-        <a:latin typeface="+mn-lt"/>
-        <a:ea typeface="+mn-ea"/>
-        <a:cs typeface="+mn-cs"/>
-      </a:defRPr>
-    </a:lvl1pPr>
-    <a:lvl2pPr marL="457200" algn="l" defTabSz="914400" rtl="0" eaLnBrk="1" latinLnBrk="0" hangingPunct="1">
-      <a:defRPr sz="1200" kern="1200">
-        <a:solidFill>
-          <a:schemeClr val="tx1"/>
-        </a:solidFill>
-        <a:latin typeface="+mn-lt"/>
-        <a:ea typeface="+mn-ea"/>
-        <a:cs typeface="+mn-cs"/>
-      </a:defRPr>
-    </a:lvl2pPr>
-    <a:lvl3pPr marL="914400" algn="l" defTabSz="914400" rtl="0" eaLnBrk="1" latinLnBrk="0" hangingPunct="1">
-      <a:defRPr sz="1200" kern="1200">
-        <a:solidFill>
-          <a:schemeClr val="tx1"/>
-        </a:solidFill>
-        <a:latin typeface="+mn-lt"/>
-        <a:ea typeface="+mn-ea"/>
-        <a:cs typeface="+mn-cs"/>
-      </a:defRPr>
-    </a:lvl3pPr>
-    <a:lvl4pPr marL="1371600" algn="l" defTabSz="914400" rtl="0" eaLnBrk="1" latinLnBrk="0" hangingPunct="1">
-      <a:defRPr sz="1200" kern="1200">
-        <a:solidFill>
-          <a:schemeClr val="tx1"/>
-        </a:solidFill>
-        <a:latin typeface="+mn-lt"/>
-        <a:ea typeface="+mn-ea"/>
-        <a:cs typeface="+mn-cs"/>
-      </a:defRPr>
-    </a:lvl4pPr>
-    <a:lvl5pPr marL="1828800" algn="l" defTabSz="914400" rtl="0" eaLnBrk="1" latinLnBrk="0" hangingPunct="1">
-      <a:defRPr sz="1200" kern="1200">
-        <a:solidFill>
-          <a:schemeClr val="tx1"/>
-        </a:solidFill>
-        <a:latin typeface="+mn-lt"/>
-        <a:ea typeface="+mn-ea"/>
-        <a:cs typeface="+mn-cs"/>
-      </a:defRPr>
-    </a:lvl5pPr>
-    <a:lvl6pPr marL="2286000" algn="l" defTabSz="914400" rtl="0" eaLnBrk="1" latinLnBrk="0" hangingPunct="1">
-      <a:defRPr sz="1200" kern="1200">
-        <a:solidFill>
-          <a:schemeClr val="tx1"/>
-        </a:solidFill>
-        <a:latin typeface="+mn-lt"/>
-        <a:ea typeface="+mn-ea"/>
-        <a:cs typeface="+mn-cs"/>
-      </a:defRPr>
-    </a:lvl6pPr>
-    <a:lvl7pPr marL="2743200" algn="l" defTabSz="914400" rtl="0" eaLnBrk="1" latinLnBrk="0" hangingPunct="1">
-      <a:defRPr sz="1200" kern="1200">
-        <a:solidFill>
-          <a:schemeClr val="tx1"/>
-        </a:solidFill>
-        <a:latin typeface="+mn-lt"/>
-        <a:ea typeface="+mn-ea"/>
-        <a:cs typeface="+mn-cs"/>
-      </a:defRPr>
-    </a:lvl7pPr>
-    <a:lvl8pPr marL="3200400" algn="l" defTabSz="914400" rtl="0" eaLnBrk="1" latinLnBrk="0" hangingPunct="1">
-      <a:defRPr sz="1200" kern="1200">
-        <a:solidFill>
-          <a:schemeClr val="tx1"/>
-        </a:solidFill>
-        <a:latin typeface="+mn-lt"/>
-        <a:ea typeface="+mn-ea"/>
-        <a:cs typeface="+mn-cs"/>
-      </a:defRPr>
-    </a:lvl8pPr>
-    <a:lvl9pPr marL="3657600" algn="l" defTabSz="914400" rtl="0" eaLnBrk="1" latinLnBrk="0" hangingPunct="1">
-      <a:defRPr sz="1200" kern="1200">
-        <a:solidFill>
-          <a:schemeClr val="tx1"/>
-        </a:solidFill>
-        <a:latin typeface="+mn-lt"/>
-        <a:ea typeface="+mn-ea"/>
-        <a:cs typeface="+mn-cs"/>
-      </a:defRPr>
-    </a:lvl9pPr>
-  </p:notesStyle>
-</p:notesMaster>
 </file>
 
 <file path=ppt/slideLayouts/slideLayout1.xml><?xml version="1.0" encoding="utf-8"?>
@@ -504,7 +129,7 @@
           <p:cNvPr id="2" name="Title 1">
             <a:extLst>
               <a:ext uri="{FF2B5EF4-FFF2-40B4-BE49-F238E27FC236}">
-                <a16:creationId xmlns:a16="http://schemas.microsoft.com/office/drawing/2014/main" id="{8D86064F-E7E6-334F-88ED-A48CAFBBF8B6}"/>
+                <a16:creationId xmlns:a16="http://schemas.microsoft.com/office/drawing/2014/main" id="{2BD669D3-EA77-2D42-31AC-4B2E264A5692}"/>
               </a:ext>
             </a:extLst>
           </p:cNvPr>
@@ -541,7 +166,7 @@
           <p:cNvPr id="3" name="Subtitle 2">
             <a:extLst>
               <a:ext uri="{FF2B5EF4-FFF2-40B4-BE49-F238E27FC236}">
-                <a16:creationId xmlns:a16="http://schemas.microsoft.com/office/drawing/2014/main" id="{B6F704C8-D56B-C141-A52B-312921FD2FE2}"/>
+                <a16:creationId xmlns:a16="http://schemas.microsoft.com/office/drawing/2014/main" id="{F7BC186F-FD8A-D09B-1FFF-DEC758B98E07}"/>
               </a:ext>
             </a:extLst>
           </p:cNvPr>
@@ -611,7 +236,7 @@
           <p:cNvPr id="4" name="Date Placeholder 3">
             <a:extLst>
               <a:ext uri="{FF2B5EF4-FFF2-40B4-BE49-F238E27FC236}">
-                <a16:creationId xmlns:a16="http://schemas.microsoft.com/office/drawing/2014/main" id="{7B50E0E6-7CC7-BE44-A059-823531566E5B}"/>
+                <a16:creationId xmlns:a16="http://schemas.microsoft.com/office/drawing/2014/main" id="{CB61F232-31D0-2C4C-E695-3EFBAD70C7D8}"/>
               </a:ext>
             </a:extLst>
           </p:cNvPr>
@@ -627,9 +252,9 @@
           <a:bodyPr/>
           <a:lstStyle/>
           <a:p>
-            <a:fld id="{DA2F9FC9-3FB7-7F46-83F3-21A28C7A694C}" type="datetimeFigureOut">
+            <a:fld id="{4803A9DE-CF9E-41A1-B23A-826744E0A338}" type="datetimeFigureOut">
               <a:rPr lang="en-US" smtClean="0"/>
-              <a:t>9/21/2023</a:t>
+              <a:t>5/21/2024</a:t>
             </a:fld>
             <a:endParaRPr lang="en-US"/>
           </a:p>
@@ -640,7 +265,7 @@
           <p:cNvPr id="5" name="Footer Placeholder 4">
             <a:extLst>
               <a:ext uri="{FF2B5EF4-FFF2-40B4-BE49-F238E27FC236}">
-                <a16:creationId xmlns:a16="http://schemas.microsoft.com/office/drawing/2014/main" id="{7148B3F7-9C56-D94D-A844-A5A15174FA61}"/>
+                <a16:creationId xmlns:a16="http://schemas.microsoft.com/office/drawing/2014/main" id="{9B513135-1CB1-6497-0FBD-E3C7D151F4C1}"/>
               </a:ext>
             </a:extLst>
           </p:cNvPr>
@@ -665,7 +290,7 @@
           <p:cNvPr id="6" name="Slide Number Placeholder 5">
             <a:extLst>
               <a:ext uri="{FF2B5EF4-FFF2-40B4-BE49-F238E27FC236}">
-                <a16:creationId xmlns:a16="http://schemas.microsoft.com/office/drawing/2014/main" id="{B07053FA-4E63-2040-B16D-0DE8E5BA090E}"/>
+                <a16:creationId xmlns:a16="http://schemas.microsoft.com/office/drawing/2014/main" id="{8346E506-6E1C-A8C5-E206-096B0C4BBA3D}"/>
               </a:ext>
             </a:extLst>
           </p:cNvPr>
@@ -681,7 +306,7 @@
           <a:bodyPr/>
           <a:lstStyle/>
           <a:p>
-            <a:fld id="{949F184B-DAB7-9945-8324-3CF43A8B7D87}" type="slidenum">
+            <a:fld id="{3A72B03F-E2C0-4FB3-BA39-D9456EEE9B7B}" type="slidenum">
               <a:rPr lang="en-US" smtClean="0"/>
               <a:t>‹#›</a:t>
             </a:fld>
@@ -692,7 +317,7 @@
     </p:spTree>
     <p:extLst>
       <p:ext uri="{BB962C8B-B14F-4D97-AF65-F5344CB8AC3E}">
-        <p14:creationId xmlns:p14="http://schemas.microsoft.com/office/powerpoint/2010/main" val="3259060828"/>
+        <p14:creationId xmlns:p14="http://schemas.microsoft.com/office/powerpoint/2010/main" val="3233349421"/>
       </p:ext>
     </p:extLst>
   </p:cSld>
@@ -724,7 +349,7 @@
           <p:cNvPr id="2" name="Title 1">
             <a:extLst>
               <a:ext uri="{FF2B5EF4-FFF2-40B4-BE49-F238E27FC236}">
-                <a16:creationId xmlns:a16="http://schemas.microsoft.com/office/drawing/2014/main" id="{A644C57B-2271-A248-ADEB-58CB4DAB15CE}"/>
+                <a16:creationId xmlns:a16="http://schemas.microsoft.com/office/drawing/2014/main" id="{AA0723D5-63BA-7AA8-D4AE-6BA55F5AD208}"/>
               </a:ext>
             </a:extLst>
           </p:cNvPr>
@@ -752,7 +377,7 @@
           <p:cNvPr id="3" name="Vertical Text Placeholder 2">
             <a:extLst>
               <a:ext uri="{FF2B5EF4-FFF2-40B4-BE49-F238E27FC236}">
-                <a16:creationId xmlns:a16="http://schemas.microsoft.com/office/drawing/2014/main" id="{B7EB66D6-D553-B944-9884-19CB59E4E755}"/>
+                <a16:creationId xmlns:a16="http://schemas.microsoft.com/office/drawing/2014/main" id="{E42BAEC6-6EBE-3B2B-3484-9DA48EB5DAE4}"/>
               </a:ext>
             </a:extLst>
           </p:cNvPr>
@@ -809,7 +434,7 @@
           <p:cNvPr id="4" name="Date Placeholder 3">
             <a:extLst>
               <a:ext uri="{FF2B5EF4-FFF2-40B4-BE49-F238E27FC236}">
-                <a16:creationId xmlns:a16="http://schemas.microsoft.com/office/drawing/2014/main" id="{69BC53B8-568E-884F-9A6F-53415E5D9B33}"/>
+                <a16:creationId xmlns:a16="http://schemas.microsoft.com/office/drawing/2014/main" id="{380736B0-6DE1-F5C9-0820-833D81C8FDFF}"/>
               </a:ext>
             </a:extLst>
           </p:cNvPr>
@@ -825,9 +450,9 @@
           <a:bodyPr/>
           <a:lstStyle/>
           <a:p>
-            <a:fld id="{DA2F9FC9-3FB7-7F46-83F3-21A28C7A694C}" type="datetimeFigureOut">
+            <a:fld id="{4803A9DE-CF9E-41A1-B23A-826744E0A338}" type="datetimeFigureOut">
               <a:rPr lang="en-US" smtClean="0"/>
-              <a:t>9/21/2023</a:t>
+              <a:t>5/21/2024</a:t>
             </a:fld>
             <a:endParaRPr lang="en-US"/>
           </a:p>
@@ -838,7 +463,7 @@
           <p:cNvPr id="5" name="Footer Placeholder 4">
             <a:extLst>
               <a:ext uri="{FF2B5EF4-FFF2-40B4-BE49-F238E27FC236}">
-                <a16:creationId xmlns:a16="http://schemas.microsoft.com/office/drawing/2014/main" id="{F1FA6973-2932-BD45-AFDF-C8194B7FEC8D}"/>
+                <a16:creationId xmlns:a16="http://schemas.microsoft.com/office/drawing/2014/main" id="{DE275EE8-9231-D716-CC81-B85D8122B403}"/>
               </a:ext>
             </a:extLst>
           </p:cNvPr>
@@ -863,7 +488,7 @@
           <p:cNvPr id="6" name="Slide Number Placeholder 5">
             <a:extLst>
               <a:ext uri="{FF2B5EF4-FFF2-40B4-BE49-F238E27FC236}">
-                <a16:creationId xmlns:a16="http://schemas.microsoft.com/office/drawing/2014/main" id="{EC25634B-B6F6-FC4B-9720-4C5DEA52FC0D}"/>
+                <a16:creationId xmlns:a16="http://schemas.microsoft.com/office/drawing/2014/main" id="{67DEBD4D-A039-8538-699E-7B435F3ED7F5}"/>
               </a:ext>
             </a:extLst>
           </p:cNvPr>
@@ -879,7 +504,7 @@
           <a:bodyPr/>
           <a:lstStyle/>
           <a:p>
-            <a:fld id="{949F184B-DAB7-9945-8324-3CF43A8B7D87}" type="slidenum">
+            <a:fld id="{3A72B03F-E2C0-4FB3-BA39-D9456EEE9B7B}" type="slidenum">
               <a:rPr lang="en-US" smtClean="0"/>
               <a:t>‹#›</a:t>
             </a:fld>
@@ -890,7 +515,7 @@
     </p:spTree>
     <p:extLst>
       <p:ext uri="{BB962C8B-B14F-4D97-AF65-F5344CB8AC3E}">
-        <p14:creationId xmlns:p14="http://schemas.microsoft.com/office/powerpoint/2010/main" val="2611011334"/>
+        <p14:creationId xmlns:p14="http://schemas.microsoft.com/office/powerpoint/2010/main" val="1576674460"/>
       </p:ext>
     </p:extLst>
   </p:cSld>
@@ -922,7 +547,7 @@
           <p:cNvPr id="2" name="Vertical Title 1">
             <a:extLst>
               <a:ext uri="{FF2B5EF4-FFF2-40B4-BE49-F238E27FC236}">
-                <a16:creationId xmlns:a16="http://schemas.microsoft.com/office/drawing/2014/main" id="{DA6FA06C-E88B-8D46-9CA3-5C295DC3D686}"/>
+                <a16:creationId xmlns:a16="http://schemas.microsoft.com/office/drawing/2014/main" id="{2139A09A-71A0-B0F3-FCA4-0D9AE56E0EA0}"/>
               </a:ext>
             </a:extLst>
           </p:cNvPr>
@@ -955,7 +580,7 @@
           <p:cNvPr id="3" name="Vertical Text Placeholder 2">
             <a:extLst>
               <a:ext uri="{FF2B5EF4-FFF2-40B4-BE49-F238E27FC236}">
-                <a16:creationId xmlns:a16="http://schemas.microsoft.com/office/drawing/2014/main" id="{2D962F14-B5D6-B541-B3C4-27B96CFB081E}"/>
+                <a16:creationId xmlns:a16="http://schemas.microsoft.com/office/drawing/2014/main" id="{F7560F4C-B0FF-91EE-ECE1-0939E65DD131}"/>
               </a:ext>
             </a:extLst>
           </p:cNvPr>
@@ -1017,7 +642,7 @@
           <p:cNvPr id="4" name="Date Placeholder 3">
             <a:extLst>
               <a:ext uri="{FF2B5EF4-FFF2-40B4-BE49-F238E27FC236}">
-                <a16:creationId xmlns:a16="http://schemas.microsoft.com/office/drawing/2014/main" id="{AE033D37-A15B-0941-88BB-9A073C2B6140}"/>
+                <a16:creationId xmlns:a16="http://schemas.microsoft.com/office/drawing/2014/main" id="{7308E74D-B372-A5A4-BEF6-40C75FDA56E7}"/>
               </a:ext>
             </a:extLst>
           </p:cNvPr>
@@ -1033,9 +658,9 @@
           <a:bodyPr/>
           <a:lstStyle/>
           <a:p>
-            <a:fld id="{DA2F9FC9-3FB7-7F46-83F3-21A28C7A694C}" type="datetimeFigureOut">
+            <a:fld id="{4803A9DE-CF9E-41A1-B23A-826744E0A338}" type="datetimeFigureOut">
               <a:rPr lang="en-US" smtClean="0"/>
-              <a:t>9/21/2023</a:t>
+              <a:t>5/21/2024</a:t>
             </a:fld>
             <a:endParaRPr lang="en-US"/>
           </a:p>
@@ -1046,7 +671,7 @@
           <p:cNvPr id="5" name="Footer Placeholder 4">
             <a:extLst>
               <a:ext uri="{FF2B5EF4-FFF2-40B4-BE49-F238E27FC236}">
-                <a16:creationId xmlns:a16="http://schemas.microsoft.com/office/drawing/2014/main" id="{2AB6A729-C2A0-0D4C-B465-FFEEC127631E}"/>
+                <a16:creationId xmlns:a16="http://schemas.microsoft.com/office/drawing/2014/main" id="{C27703A2-AB16-4A2D-67EA-1ABAEDE3DA0E}"/>
               </a:ext>
             </a:extLst>
           </p:cNvPr>
@@ -1071,7 +696,7 @@
           <p:cNvPr id="6" name="Slide Number Placeholder 5">
             <a:extLst>
               <a:ext uri="{FF2B5EF4-FFF2-40B4-BE49-F238E27FC236}">
-                <a16:creationId xmlns:a16="http://schemas.microsoft.com/office/drawing/2014/main" id="{4EE8A23E-107A-C54E-B295-08CA53843C82}"/>
+                <a16:creationId xmlns:a16="http://schemas.microsoft.com/office/drawing/2014/main" id="{35D4AD90-3BEB-3A82-8E76-BAAC0D37BEE0}"/>
               </a:ext>
             </a:extLst>
           </p:cNvPr>
@@ -1087,7 +712,7 @@
           <a:bodyPr/>
           <a:lstStyle/>
           <a:p>
-            <a:fld id="{949F184B-DAB7-9945-8324-3CF43A8B7D87}" type="slidenum">
+            <a:fld id="{3A72B03F-E2C0-4FB3-BA39-D9456EEE9B7B}" type="slidenum">
               <a:rPr lang="en-US" smtClean="0"/>
               <a:t>‹#›</a:t>
             </a:fld>
@@ -1098,7 +723,7 @@
     </p:spTree>
     <p:extLst>
       <p:ext uri="{BB962C8B-B14F-4D97-AF65-F5344CB8AC3E}">
-        <p14:creationId xmlns:p14="http://schemas.microsoft.com/office/powerpoint/2010/main" val="2394588097"/>
+        <p14:creationId xmlns:p14="http://schemas.microsoft.com/office/powerpoint/2010/main" val="1912813015"/>
       </p:ext>
     </p:extLst>
   </p:cSld>
@@ -1130,7 +755,7 @@
           <p:cNvPr id="2" name="Title 1">
             <a:extLst>
               <a:ext uri="{FF2B5EF4-FFF2-40B4-BE49-F238E27FC236}">
-                <a16:creationId xmlns:a16="http://schemas.microsoft.com/office/drawing/2014/main" id="{3F2F798C-5448-1545-919A-21F7AF4119BC}"/>
+                <a16:creationId xmlns:a16="http://schemas.microsoft.com/office/drawing/2014/main" id="{8E651851-1DD3-1A27-FB1F-58FF3A9535EE}"/>
               </a:ext>
             </a:extLst>
           </p:cNvPr>
@@ -1158,7 +783,7 @@
           <p:cNvPr id="3" name="Content Placeholder 2">
             <a:extLst>
               <a:ext uri="{FF2B5EF4-FFF2-40B4-BE49-F238E27FC236}">
-                <a16:creationId xmlns:a16="http://schemas.microsoft.com/office/drawing/2014/main" id="{DAD962B7-DA2A-7840-82E1-1849034F550F}"/>
+                <a16:creationId xmlns:a16="http://schemas.microsoft.com/office/drawing/2014/main" id="{458204CD-2DA7-30AC-9E8B-9D474951469B}"/>
               </a:ext>
             </a:extLst>
           </p:cNvPr>
@@ -1215,7 +840,7 @@
           <p:cNvPr id="4" name="Date Placeholder 3">
             <a:extLst>
               <a:ext uri="{FF2B5EF4-FFF2-40B4-BE49-F238E27FC236}">
-                <a16:creationId xmlns:a16="http://schemas.microsoft.com/office/drawing/2014/main" id="{F8479BC8-ECFC-9143-AA04-18BA9C3F3769}"/>
+                <a16:creationId xmlns:a16="http://schemas.microsoft.com/office/drawing/2014/main" id="{A5916643-3C88-8604-95CF-0F3AE33E43FB}"/>
               </a:ext>
             </a:extLst>
           </p:cNvPr>
@@ -1231,9 +856,9 @@
           <a:bodyPr/>
           <a:lstStyle/>
           <a:p>
-            <a:fld id="{DA2F9FC9-3FB7-7F46-83F3-21A28C7A694C}" type="datetimeFigureOut">
+            <a:fld id="{4803A9DE-CF9E-41A1-B23A-826744E0A338}" type="datetimeFigureOut">
               <a:rPr lang="en-US" smtClean="0"/>
-              <a:t>9/21/2023</a:t>
+              <a:t>5/21/2024</a:t>
             </a:fld>
             <a:endParaRPr lang="en-US"/>
           </a:p>
@@ -1244,7 +869,7 @@
           <p:cNvPr id="5" name="Footer Placeholder 4">
             <a:extLst>
               <a:ext uri="{FF2B5EF4-FFF2-40B4-BE49-F238E27FC236}">
-                <a16:creationId xmlns:a16="http://schemas.microsoft.com/office/drawing/2014/main" id="{488B0FA6-3F27-BA48-A35B-C7279035F857}"/>
+                <a16:creationId xmlns:a16="http://schemas.microsoft.com/office/drawing/2014/main" id="{E3F6EE91-195A-BE39-1ED4-49904E5482C9}"/>
               </a:ext>
             </a:extLst>
           </p:cNvPr>
@@ -1269,7 +894,7 @@
           <p:cNvPr id="6" name="Slide Number Placeholder 5">
             <a:extLst>
               <a:ext uri="{FF2B5EF4-FFF2-40B4-BE49-F238E27FC236}">
-                <a16:creationId xmlns:a16="http://schemas.microsoft.com/office/drawing/2014/main" id="{D260C2DC-68CB-7045-83CF-7E2FEBEF9CD3}"/>
+                <a16:creationId xmlns:a16="http://schemas.microsoft.com/office/drawing/2014/main" id="{DF58FCA5-B2B4-121B-AB4B-F6EA3828391B}"/>
               </a:ext>
             </a:extLst>
           </p:cNvPr>
@@ -1285,7 +910,7 @@
           <a:bodyPr/>
           <a:lstStyle/>
           <a:p>
-            <a:fld id="{949F184B-DAB7-9945-8324-3CF43A8B7D87}" type="slidenum">
+            <a:fld id="{3A72B03F-E2C0-4FB3-BA39-D9456EEE9B7B}" type="slidenum">
               <a:rPr lang="en-US" smtClean="0"/>
               <a:t>‹#›</a:t>
             </a:fld>
@@ -1296,7 +921,7 @@
     </p:spTree>
     <p:extLst>
       <p:ext uri="{BB962C8B-B14F-4D97-AF65-F5344CB8AC3E}">
-        <p14:creationId xmlns:p14="http://schemas.microsoft.com/office/powerpoint/2010/main" val="2031306766"/>
+        <p14:creationId xmlns:p14="http://schemas.microsoft.com/office/powerpoint/2010/main" val="2230073942"/>
       </p:ext>
     </p:extLst>
   </p:cSld>
@@ -1328,7 +953,7 @@
           <p:cNvPr id="2" name="Title 1">
             <a:extLst>
               <a:ext uri="{FF2B5EF4-FFF2-40B4-BE49-F238E27FC236}">
-                <a16:creationId xmlns:a16="http://schemas.microsoft.com/office/drawing/2014/main" id="{40688BC7-6559-A84E-AA30-8126127A15C9}"/>
+                <a16:creationId xmlns:a16="http://schemas.microsoft.com/office/drawing/2014/main" id="{0DCC54A2-4B73-60CE-AE14-407A743DFE9F}"/>
               </a:ext>
             </a:extLst>
           </p:cNvPr>
@@ -1365,7 +990,7 @@
           <p:cNvPr id="3" name="Text Placeholder 2">
             <a:extLst>
               <a:ext uri="{FF2B5EF4-FFF2-40B4-BE49-F238E27FC236}">
-                <a16:creationId xmlns:a16="http://schemas.microsoft.com/office/drawing/2014/main" id="{B6D7BBD8-92D6-2A46-B136-31E0A7B4CCFA}"/>
+                <a16:creationId xmlns:a16="http://schemas.microsoft.com/office/drawing/2014/main" id="{42412767-4E41-7D5C-445A-47F0C1A87C70}"/>
               </a:ext>
             </a:extLst>
           </p:cNvPr>
@@ -1490,7 +1115,7 @@
           <p:cNvPr id="4" name="Date Placeholder 3">
             <a:extLst>
               <a:ext uri="{FF2B5EF4-FFF2-40B4-BE49-F238E27FC236}">
-                <a16:creationId xmlns:a16="http://schemas.microsoft.com/office/drawing/2014/main" id="{78F0D0CA-2D72-4249-B49C-333ABB54CBA8}"/>
+                <a16:creationId xmlns:a16="http://schemas.microsoft.com/office/drawing/2014/main" id="{A2B008F1-4EBD-1085-BDE6-1AB6F45C224F}"/>
               </a:ext>
             </a:extLst>
           </p:cNvPr>
@@ -1506,9 +1131,9 @@
           <a:bodyPr/>
           <a:lstStyle/>
           <a:p>
-            <a:fld id="{DA2F9FC9-3FB7-7F46-83F3-21A28C7A694C}" type="datetimeFigureOut">
+            <a:fld id="{4803A9DE-CF9E-41A1-B23A-826744E0A338}" type="datetimeFigureOut">
               <a:rPr lang="en-US" smtClean="0"/>
-              <a:t>9/21/2023</a:t>
+              <a:t>5/21/2024</a:t>
             </a:fld>
             <a:endParaRPr lang="en-US"/>
           </a:p>
@@ -1519,7 +1144,7 @@
           <p:cNvPr id="5" name="Footer Placeholder 4">
             <a:extLst>
               <a:ext uri="{FF2B5EF4-FFF2-40B4-BE49-F238E27FC236}">
-                <a16:creationId xmlns:a16="http://schemas.microsoft.com/office/drawing/2014/main" id="{1594D8E0-96AE-FB4F-B4D4-3DA7DE00AE62}"/>
+                <a16:creationId xmlns:a16="http://schemas.microsoft.com/office/drawing/2014/main" id="{CFCBFC6D-B9C8-74EB-2F09-C5C2A7A64324}"/>
               </a:ext>
             </a:extLst>
           </p:cNvPr>
@@ -1544,7 +1169,7 @@
           <p:cNvPr id="6" name="Slide Number Placeholder 5">
             <a:extLst>
               <a:ext uri="{FF2B5EF4-FFF2-40B4-BE49-F238E27FC236}">
-                <a16:creationId xmlns:a16="http://schemas.microsoft.com/office/drawing/2014/main" id="{356A90F6-ECB6-ED47-9047-8AC934B85224}"/>
+                <a16:creationId xmlns:a16="http://schemas.microsoft.com/office/drawing/2014/main" id="{A6EBC780-7A8C-4B0F-C52E-E9FF08651F18}"/>
               </a:ext>
             </a:extLst>
           </p:cNvPr>
@@ -1560,7 +1185,7 @@
           <a:bodyPr/>
           <a:lstStyle/>
           <a:p>
-            <a:fld id="{949F184B-DAB7-9945-8324-3CF43A8B7D87}" type="slidenum">
+            <a:fld id="{3A72B03F-E2C0-4FB3-BA39-D9456EEE9B7B}" type="slidenum">
               <a:rPr lang="en-US" smtClean="0"/>
               <a:t>‹#›</a:t>
             </a:fld>
@@ -1571,7 +1196,7 @@
     </p:spTree>
     <p:extLst>
       <p:ext uri="{BB962C8B-B14F-4D97-AF65-F5344CB8AC3E}">
-        <p14:creationId xmlns:p14="http://schemas.microsoft.com/office/powerpoint/2010/main" val="3125359597"/>
+        <p14:creationId xmlns:p14="http://schemas.microsoft.com/office/powerpoint/2010/main" val="2151664732"/>
       </p:ext>
     </p:extLst>
   </p:cSld>
@@ -1603,7 +1228,7 @@
           <p:cNvPr id="2" name="Title 1">
             <a:extLst>
               <a:ext uri="{FF2B5EF4-FFF2-40B4-BE49-F238E27FC236}">
-                <a16:creationId xmlns:a16="http://schemas.microsoft.com/office/drawing/2014/main" id="{C723C601-1B68-7A43-8B11-12165222FC78}"/>
+                <a16:creationId xmlns:a16="http://schemas.microsoft.com/office/drawing/2014/main" id="{01FF2DA4-C15A-34B9-246A-D3A3E1B3E61C}"/>
               </a:ext>
             </a:extLst>
           </p:cNvPr>
@@ -1631,7 +1256,7 @@
           <p:cNvPr id="3" name="Content Placeholder 2">
             <a:extLst>
               <a:ext uri="{FF2B5EF4-FFF2-40B4-BE49-F238E27FC236}">
-                <a16:creationId xmlns:a16="http://schemas.microsoft.com/office/drawing/2014/main" id="{40EDF462-DBF7-364B-85AB-ABF3E5198551}"/>
+                <a16:creationId xmlns:a16="http://schemas.microsoft.com/office/drawing/2014/main" id="{DE668320-FC7C-6A7C-3EB3-50BA38C32327}"/>
               </a:ext>
             </a:extLst>
           </p:cNvPr>
@@ -1693,7 +1318,7 @@
           <p:cNvPr id="4" name="Content Placeholder 3">
             <a:extLst>
               <a:ext uri="{FF2B5EF4-FFF2-40B4-BE49-F238E27FC236}">
-                <a16:creationId xmlns:a16="http://schemas.microsoft.com/office/drawing/2014/main" id="{6459C41C-198D-E84D-8D3A-CBFAF23F08FC}"/>
+                <a16:creationId xmlns:a16="http://schemas.microsoft.com/office/drawing/2014/main" id="{5492576B-A08F-8142-A04E-00BE85D9EEEA}"/>
               </a:ext>
             </a:extLst>
           </p:cNvPr>
@@ -1755,7 +1380,7 @@
           <p:cNvPr id="5" name="Date Placeholder 4">
             <a:extLst>
               <a:ext uri="{FF2B5EF4-FFF2-40B4-BE49-F238E27FC236}">
-                <a16:creationId xmlns:a16="http://schemas.microsoft.com/office/drawing/2014/main" id="{DD38A6EE-0C73-8146-920E-C3AB4EBBB6FF}"/>
+                <a16:creationId xmlns:a16="http://schemas.microsoft.com/office/drawing/2014/main" id="{B176E544-B10A-A7D2-26DE-05B19B7A53E7}"/>
               </a:ext>
             </a:extLst>
           </p:cNvPr>
@@ -1771,9 +1396,9 @@
           <a:bodyPr/>
           <a:lstStyle/>
           <a:p>
-            <a:fld id="{DA2F9FC9-3FB7-7F46-83F3-21A28C7A694C}" type="datetimeFigureOut">
+            <a:fld id="{4803A9DE-CF9E-41A1-B23A-826744E0A338}" type="datetimeFigureOut">
               <a:rPr lang="en-US" smtClean="0"/>
-              <a:t>9/21/2023</a:t>
+              <a:t>5/21/2024</a:t>
             </a:fld>
             <a:endParaRPr lang="en-US"/>
           </a:p>
@@ -1784,7 +1409,7 @@
           <p:cNvPr id="6" name="Footer Placeholder 5">
             <a:extLst>
               <a:ext uri="{FF2B5EF4-FFF2-40B4-BE49-F238E27FC236}">
-                <a16:creationId xmlns:a16="http://schemas.microsoft.com/office/drawing/2014/main" id="{7D651D36-3E24-974B-8426-DE12CA905DFF}"/>
+                <a16:creationId xmlns:a16="http://schemas.microsoft.com/office/drawing/2014/main" id="{B96E8000-FF79-FD7D-6B5B-4068F0074A60}"/>
               </a:ext>
             </a:extLst>
           </p:cNvPr>
@@ -1809,7 +1434,7 @@
           <p:cNvPr id="7" name="Slide Number Placeholder 6">
             <a:extLst>
               <a:ext uri="{FF2B5EF4-FFF2-40B4-BE49-F238E27FC236}">
-                <a16:creationId xmlns:a16="http://schemas.microsoft.com/office/drawing/2014/main" id="{9D9ADD45-9950-7249-8951-4EB43EAFB7CA}"/>
+                <a16:creationId xmlns:a16="http://schemas.microsoft.com/office/drawing/2014/main" id="{54663563-1BCC-E754-BAED-9463A7AFF509}"/>
               </a:ext>
             </a:extLst>
           </p:cNvPr>
@@ -1825,7 +1450,7 @@
           <a:bodyPr/>
           <a:lstStyle/>
           <a:p>
-            <a:fld id="{949F184B-DAB7-9945-8324-3CF43A8B7D87}" type="slidenum">
+            <a:fld id="{3A72B03F-E2C0-4FB3-BA39-D9456EEE9B7B}" type="slidenum">
               <a:rPr lang="en-US" smtClean="0"/>
               <a:t>‹#›</a:t>
             </a:fld>
@@ -1836,7 +1461,7 @@
     </p:spTree>
     <p:extLst>
       <p:ext uri="{BB962C8B-B14F-4D97-AF65-F5344CB8AC3E}">
-        <p14:creationId xmlns:p14="http://schemas.microsoft.com/office/powerpoint/2010/main" val="1362518604"/>
+        <p14:creationId xmlns:p14="http://schemas.microsoft.com/office/powerpoint/2010/main" val="2228732910"/>
       </p:ext>
     </p:extLst>
   </p:cSld>
@@ -1868,7 +1493,7 @@
           <p:cNvPr id="2" name="Title 1">
             <a:extLst>
               <a:ext uri="{FF2B5EF4-FFF2-40B4-BE49-F238E27FC236}">
-                <a16:creationId xmlns:a16="http://schemas.microsoft.com/office/drawing/2014/main" id="{F81C2A91-A388-634E-8EDF-2CB8A3105520}"/>
+                <a16:creationId xmlns:a16="http://schemas.microsoft.com/office/drawing/2014/main" id="{AEF4327A-5F2B-AF3D-4566-8790119E827C}"/>
               </a:ext>
             </a:extLst>
           </p:cNvPr>
@@ -1901,7 +1526,7 @@
           <p:cNvPr id="3" name="Text Placeholder 2">
             <a:extLst>
               <a:ext uri="{FF2B5EF4-FFF2-40B4-BE49-F238E27FC236}">
-                <a16:creationId xmlns:a16="http://schemas.microsoft.com/office/drawing/2014/main" id="{917F0898-E9F6-E547-8768-5D2CFF6FD5D1}"/>
+                <a16:creationId xmlns:a16="http://schemas.microsoft.com/office/drawing/2014/main" id="{09E10983-0F87-1E23-AD4B-27DA72CEBE87}"/>
               </a:ext>
             </a:extLst>
           </p:cNvPr>
@@ -1972,7 +1597,7 @@
           <p:cNvPr id="4" name="Content Placeholder 3">
             <a:extLst>
               <a:ext uri="{FF2B5EF4-FFF2-40B4-BE49-F238E27FC236}">
-                <a16:creationId xmlns:a16="http://schemas.microsoft.com/office/drawing/2014/main" id="{986E0AAF-FFC3-544A-8B12-12340476BB9C}"/>
+                <a16:creationId xmlns:a16="http://schemas.microsoft.com/office/drawing/2014/main" id="{F1E7F68F-DD54-0262-C084-501C47F4DD4D}"/>
               </a:ext>
             </a:extLst>
           </p:cNvPr>
@@ -2034,7 +1659,7 @@
           <p:cNvPr id="5" name="Text Placeholder 4">
             <a:extLst>
               <a:ext uri="{FF2B5EF4-FFF2-40B4-BE49-F238E27FC236}">
-                <a16:creationId xmlns:a16="http://schemas.microsoft.com/office/drawing/2014/main" id="{A35B3D2C-F295-774F-8964-22A8FEBA56C4}"/>
+                <a16:creationId xmlns:a16="http://schemas.microsoft.com/office/drawing/2014/main" id="{0E875509-53CE-6697-C11E-4520CE6BF886}"/>
               </a:ext>
             </a:extLst>
           </p:cNvPr>
@@ -2105,7 +1730,7 @@
           <p:cNvPr id="6" name="Content Placeholder 5">
             <a:extLst>
               <a:ext uri="{FF2B5EF4-FFF2-40B4-BE49-F238E27FC236}">
-                <a16:creationId xmlns:a16="http://schemas.microsoft.com/office/drawing/2014/main" id="{CCD9716C-2FA9-0D47-B92B-E5AD9F8F6B34}"/>
+                <a16:creationId xmlns:a16="http://schemas.microsoft.com/office/drawing/2014/main" id="{521211E1-0215-F15C-185B-62EB251D4181}"/>
               </a:ext>
             </a:extLst>
           </p:cNvPr>
@@ -2167,7 +1792,7 @@
           <p:cNvPr id="7" name="Date Placeholder 6">
             <a:extLst>
               <a:ext uri="{FF2B5EF4-FFF2-40B4-BE49-F238E27FC236}">
-                <a16:creationId xmlns:a16="http://schemas.microsoft.com/office/drawing/2014/main" id="{0E2A9BC1-976E-AA4D-8238-581CC65B37AF}"/>
+                <a16:creationId xmlns:a16="http://schemas.microsoft.com/office/drawing/2014/main" id="{A9B5C638-EF93-F1C0-A929-716A04094BB6}"/>
               </a:ext>
             </a:extLst>
           </p:cNvPr>
@@ -2183,9 +1808,9 @@
           <a:bodyPr/>
           <a:lstStyle/>
           <a:p>
-            <a:fld id="{DA2F9FC9-3FB7-7F46-83F3-21A28C7A694C}" type="datetimeFigureOut">
+            <a:fld id="{4803A9DE-CF9E-41A1-B23A-826744E0A338}" type="datetimeFigureOut">
               <a:rPr lang="en-US" smtClean="0"/>
-              <a:t>9/21/2023</a:t>
+              <a:t>5/21/2024</a:t>
             </a:fld>
             <a:endParaRPr lang="en-US"/>
           </a:p>
@@ -2196,7 +1821,7 @@
           <p:cNvPr id="8" name="Footer Placeholder 7">
             <a:extLst>
               <a:ext uri="{FF2B5EF4-FFF2-40B4-BE49-F238E27FC236}">
-                <a16:creationId xmlns:a16="http://schemas.microsoft.com/office/drawing/2014/main" id="{F5E4DF11-3822-9441-8CED-E1AF977DABD3}"/>
+                <a16:creationId xmlns:a16="http://schemas.microsoft.com/office/drawing/2014/main" id="{9B9EA597-8724-E2E1-32D7-A33E6CD4DEA1}"/>
               </a:ext>
             </a:extLst>
           </p:cNvPr>
@@ -2221,7 +1846,7 @@
           <p:cNvPr id="9" name="Slide Number Placeholder 8">
             <a:extLst>
               <a:ext uri="{FF2B5EF4-FFF2-40B4-BE49-F238E27FC236}">
-                <a16:creationId xmlns:a16="http://schemas.microsoft.com/office/drawing/2014/main" id="{9827E513-C00C-B041-BC9A-57D1A94A55E7}"/>
+                <a16:creationId xmlns:a16="http://schemas.microsoft.com/office/drawing/2014/main" id="{FFB77D11-7003-CD2F-9FCF-FA892A5FDFE5}"/>
               </a:ext>
             </a:extLst>
           </p:cNvPr>
@@ -2237,7 +1862,7 @@
           <a:bodyPr/>
           <a:lstStyle/>
           <a:p>
-            <a:fld id="{949F184B-DAB7-9945-8324-3CF43A8B7D87}" type="slidenum">
+            <a:fld id="{3A72B03F-E2C0-4FB3-BA39-D9456EEE9B7B}" type="slidenum">
               <a:rPr lang="en-US" smtClean="0"/>
               <a:t>‹#›</a:t>
             </a:fld>
@@ -2248,7 +1873,7 @@
     </p:spTree>
     <p:extLst>
       <p:ext uri="{BB962C8B-B14F-4D97-AF65-F5344CB8AC3E}">
-        <p14:creationId xmlns:p14="http://schemas.microsoft.com/office/powerpoint/2010/main" val="3905960576"/>
+        <p14:creationId xmlns:p14="http://schemas.microsoft.com/office/powerpoint/2010/main" val="4007055651"/>
       </p:ext>
     </p:extLst>
   </p:cSld>
@@ -2280,7 +1905,7 @@
           <p:cNvPr id="2" name="Title 1">
             <a:extLst>
               <a:ext uri="{FF2B5EF4-FFF2-40B4-BE49-F238E27FC236}">
-                <a16:creationId xmlns:a16="http://schemas.microsoft.com/office/drawing/2014/main" id="{9EE820CA-75E9-3B44-8C84-4DAF94FE9E9C}"/>
+                <a16:creationId xmlns:a16="http://schemas.microsoft.com/office/drawing/2014/main" id="{D1503D59-D405-7C8B-35BA-D95FFACBF6C9}"/>
               </a:ext>
             </a:extLst>
           </p:cNvPr>
@@ -2308,7 +1933,7 @@
           <p:cNvPr id="3" name="Date Placeholder 2">
             <a:extLst>
               <a:ext uri="{FF2B5EF4-FFF2-40B4-BE49-F238E27FC236}">
-                <a16:creationId xmlns:a16="http://schemas.microsoft.com/office/drawing/2014/main" id="{8C243789-31AB-0944-894D-27D0335B9F62}"/>
+                <a16:creationId xmlns:a16="http://schemas.microsoft.com/office/drawing/2014/main" id="{12D99177-5207-83B3-76EC-704F35380C4C}"/>
               </a:ext>
             </a:extLst>
           </p:cNvPr>
@@ -2324,9 +1949,9 @@
           <a:bodyPr/>
           <a:lstStyle/>
           <a:p>
-            <a:fld id="{DA2F9FC9-3FB7-7F46-83F3-21A28C7A694C}" type="datetimeFigureOut">
+            <a:fld id="{4803A9DE-CF9E-41A1-B23A-826744E0A338}" type="datetimeFigureOut">
               <a:rPr lang="en-US" smtClean="0"/>
-              <a:t>9/21/2023</a:t>
+              <a:t>5/21/2024</a:t>
             </a:fld>
             <a:endParaRPr lang="en-US"/>
           </a:p>
@@ -2337,7 +1962,7 @@
           <p:cNvPr id="4" name="Footer Placeholder 3">
             <a:extLst>
               <a:ext uri="{FF2B5EF4-FFF2-40B4-BE49-F238E27FC236}">
-                <a16:creationId xmlns:a16="http://schemas.microsoft.com/office/drawing/2014/main" id="{FC541A2F-0E78-1241-830D-2E392F8AA68F}"/>
+                <a16:creationId xmlns:a16="http://schemas.microsoft.com/office/drawing/2014/main" id="{69BA0091-660A-F70C-1882-ECD2512D0B9A}"/>
               </a:ext>
             </a:extLst>
           </p:cNvPr>
@@ -2362,7 +1987,7 @@
           <p:cNvPr id="5" name="Slide Number Placeholder 4">
             <a:extLst>
               <a:ext uri="{FF2B5EF4-FFF2-40B4-BE49-F238E27FC236}">
-                <a16:creationId xmlns:a16="http://schemas.microsoft.com/office/drawing/2014/main" id="{502386F2-B160-D94A-B800-51AADE2D3910}"/>
+                <a16:creationId xmlns:a16="http://schemas.microsoft.com/office/drawing/2014/main" id="{5AAE63A2-106C-00D2-B77E-4BAF3B55769E}"/>
               </a:ext>
             </a:extLst>
           </p:cNvPr>
@@ -2378,7 +2003,7 @@
           <a:bodyPr/>
           <a:lstStyle/>
           <a:p>
-            <a:fld id="{949F184B-DAB7-9945-8324-3CF43A8B7D87}" type="slidenum">
+            <a:fld id="{3A72B03F-E2C0-4FB3-BA39-D9456EEE9B7B}" type="slidenum">
               <a:rPr lang="en-US" smtClean="0"/>
               <a:t>‹#›</a:t>
             </a:fld>
@@ -2389,7 +2014,7 @@
     </p:spTree>
     <p:extLst>
       <p:ext uri="{BB962C8B-B14F-4D97-AF65-F5344CB8AC3E}">
-        <p14:creationId xmlns:p14="http://schemas.microsoft.com/office/powerpoint/2010/main" val="3104765554"/>
+        <p14:creationId xmlns:p14="http://schemas.microsoft.com/office/powerpoint/2010/main" val="794567102"/>
       </p:ext>
     </p:extLst>
   </p:cSld>
@@ -2421,7 +2046,7 @@
           <p:cNvPr id="2" name="Date Placeholder 1">
             <a:extLst>
               <a:ext uri="{FF2B5EF4-FFF2-40B4-BE49-F238E27FC236}">
-                <a16:creationId xmlns:a16="http://schemas.microsoft.com/office/drawing/2014/main" id="{75581D49-DD4C-ED41-9072-2B55DD7A0A8F}"/>
+                <a16:creationId xmlns:a16="http://schemas.microsoft.com/office/drawing/2014/main" id="{4BB50A4F-760E-0EBF-87B6-6CCD4316A996}"/>
               </a:ext>
             </a:extLst>
           </p:cNvPr>
@@ -2437,9 +2062,9 @@
           <a:bodyPr/>
           <a:lstStyle/>
           <a:p>
-            <a:fld id="{DA2F9FC9-3FB7-7F46-83F3-21A28C7A694C}" type="datetimeFigureOut">
+            <a:fld id="{4803A9DE-CF9E-41A1-B23A-826744E0A338}" type="datetimeFigureOut">
               <a:rPr lang="en-US" smtClean="0"/>
-              <a:t>9/21/2023</a:t>
+              <a:t>5/21/2024</a:t>
             </a:fld>
             <a:endParaRPr lang="en-US"/>
           </a:p>
@@ -2450,7 +2075,7 @@
           <p:cNvPr id="3" name="Footer Placeholder 2">
             <a:extLst>
               <a:ext uri="{FF2B5EF4-FFF2-40B4-BE49-F238E27FC236}">
-                <a16:creationId xmlns:a16="http://schemas.microsoft.com/office/drawing/2014/main" id="{20C29336-473C-D746-BAFD-1C746548FAC7}"/>
+                <a16:creationId xmlns:a16="http://schemas.microsoft.com/office/drawing/2014/main" id="{7685B7ED-611E-0266-0F50-1947FD8C6548}"/>
               </a:ext>
             </a:extLst>
           </p:cNvPr>
@@ -2475,7 +2100,7 @@
           <p:cNvPr id="4" name="Slide Number Placeholder 3">
             <a:extLst>
               <a:ext uri="{FF2B5EF4-FFF2-40B4-BE49-F238E27FC236}">
-                <a16:creationId xmlns:a16="http://schemas.microsoft.com/office/drawing/2014/main" id="{39C6D349-82E7-F74A-A777-EA6BEAF50B2C}"/>
+                <a16:creationId xmlns:a16="http://schemas.microsoft.com/office/drawing/2014/main" id="{4D43692D-E543-05A3-F9B4-C74E23A7A386}"/>
               </a:ext>
             </a:extLst>
           </p:cNvPr>
@@ -2491,7 +2116,7 @@
           <a:bodyPr/>
           <a:lstStyle/>
           <a:p>
-            <a:fld id="{949F184B-DAB7-9945-8324-3CF43A8B7D87}" type="slidenum">
+            <a:fld id="{3A72B03F-E2C0-4FB3-BA39-D9456EEE9B7B}" type="slidenum">
               <a:rPr lang="en-US" smtClean="0"/>
               <a:t>‹#›</a:t>
             </a:fld>
@@ -2502,7 +2127,7 @@
     </p:spTree>
     <p:extLst>
       <p:ext uri="{BB962C8B-B14F-4D97-AF65-F5344CB8AC3E}">
-        <p14:creationId xmlns:p14="http://schemas.microsoft.com/office/powerpoint/2010/main" val="1493393974"/>
+        <p14:creationId xmlns:p14="http://schemas.microsoft.com/office/powerpoint/2010/main" val="3914650990"/>
       </p:ext>
     </p:extLst>
   </p:cSld>
@@ -2534,7 +2159,7 @@
           <p:cNvPr id="2" name="Title 1">
             <a:extLst>
               <a:ext uri="{FF2B5EF4-FFF2-40B4-BE49-F238E27FC236}">
-                <a16:creationId xmlns:a16="http://schemas.microsoft.com/office/drawing/2014/main" id="{085735F1-031A-7A42-A0DA-8EB7734C934A}"/>
+                <a16:creationId xmlns:a16="http://schemas.microsoft.com/office/drawing/2014/main" id="{EDFA3376-F1DC-3CA9-64D8-4F0987C30A72}"/>
               </a:ext>
             </a:extLst>
           </p:cNvPr>
@@ -2571,7 +2196,7 @@
           <p:cNvPr id="3" name="Content Placeholder 2">
             <a:extLst>
               <a:ext uri="{FF2B5EF4-FFF2-40B4-BE49-F238E27FC236}">
-                <a16:creationId xmlns:a16="http://schemas.microsoft.com/office/drawing/2014/main" id="{C65719BD-524C-4943-9B09-2267B6DB8BBB}"/>
+                <a16:creationId xmlns:a16="http://schemas.microsoft.com/office/drawing/2014/main" id="{88B449E6-58E3-18ED-010B-61E66E713A6E}"/>
               </a:ext>
             </a:extLst>
           </p:cNvPr>
@@ -2661,7 +2286,7 @@
           <p:cNvPr id="4" name="Text Placeholder 3">
             <a:extLst>
               <a:ext uri="{FF2B5EF4-FFF2-40B4-BE49-F238E27FC236}">
-                <a16:creationId xmlns:a16="http://schemas.microsoft.com/office/drawing/2014/main" id="{47E013E2-0A4E-9A41-ADA9-C52038E97894}"/>
+                <a16:creationId xmlns:a16="http://schemas.microsoft.com/office/drawing/2014/main" id="{24EDDA41-CF21-1BAB-C077-B1346530D2E0}"/>
               </a:ext>
             </a:extLst>
           </p:cNvPr>
@@ -2732,7 +2357,7 @@
           <p:cNvPr id="5" name="Date Placeholder 4">
             <a:extLst>
               <a:ext uri="{FF2B5EF4-FFF2-40B4-BE49-F238E27FC236}">
-                <a16:creationId xmlns:a16="http://schemas.microsoft.com/office/drawing/2014/main" id="{BFFBFCCD-5989-B043-9244-4A0FB14877BC}"/>
+                <a16:creationId xmlns:a16="http://schemas.microsoft.com/office/drawing/2014/main" id="{9C44754A-812F-88E2-D2A1-D1CD749E58AF}"/>
               </a:ext>
             </a:extLst>
           </p:cNvPr>
@@ -2748,9 +2373,9 @@
           <a:bodyPr/>
           <a:lstStyle/>
           <a:p>
-            <a:fld id="{DA2F9FC9-3FB7-7F46-83F3-21A28C7A694C}" type="datetimeFigureOut">
+            <a:fld id="{4803A9DE-CF9E-41A1-B23A-826744E0A338}" type="datetimeFigureOut">
               <a:rPr lang="en-US" smtClean="0"/>
-              <a:t>9/21/2023</a:t>
+              <a:t>5/21/2024</a:t>
             </a:fld>
             <a:endParaRPr lang="en-US"/>
           </a:p>
@@ -2761,7 +2386,7 @@
           <p:cNvPr id="6" name="Footer Placeholder 5">
             <a:extLst>
               <a:ext uri="{FF2B5EF4-FFF2-40B4-BE49-F238E27FC236}">
-                <a16:creationId xmlns:a16="http://schemas.microsoft.com/office/drawing/2014/main" id="{FE118B9B-05F8-5148-8D83-9EF732D1B5F0}"/>
+                <a16:creationId xmlns:a16="http://schemas.microsoft.com/office/drawing/2014/main" id="{7B6BA332-BABE-6203-2AAA-22BADA8BF2B4}"/>
               </a:ext>
             </a:extLst>
           </p:cNvPr>
@@ -2786,7 +2411,7 @@
           <p:cNvPr id="7" name="Slide Number Placeholder 6">
             <a:extLst>
               <a:ext uri="{FF2B5EF4-FFF2-40B4-BE49-F238E27FC236}">
-                <a16:creationId xmlns:a16="http://schemas.microsoft.com/office/drawing/2014/main" id="{15F1842B-12E6-F947-9789-86F90474B327}"/>
+                <a16:creationId xmlns:a16="http://schemas.microsoft.com/office/drawing/2014/main" id="{F28E6BB1-034D-665F-27DE-0F27CF1FAAF8}"/>
               </a:ext>
             </a:extLst>
           </p:cNvPr>
@@ -2802,7 +2427,7 @@
           <a:bodyPr/>
           <a:lstStyle/>
           <a:p>
-            <a:fld id="{949F184B-DAB7-9945-8324-3CF43A8B7D87}" type="slidenum">
+            <a:fld id="{3A72B03F-E2C0-4FB3-BA39-D9456EEE9B7B}" type="slidenum">
               <a:rPr lang="en-US" smtClean="0"/>
               <a:t>‹#›</a:t>
             </a:fld>
@@ -2813,7 +2438,7 @@
     </p:spTree>
     <p:extLst>
       <p:ext uri="{BB962C8B-B14F-4D97-AF65-F5344CB8AC3E}">
-        <p14:creationId xmlns:p14="http://schemas.microsoft.com/office/powerpoint/2010/main" val="3954361853"/>
+        <p14:creationId xmlns:p14="http://schemas.microsoft.com/office/powerpoint/2010/main" val="2298433495"/>
       </p:ext>
     </p:extLst>
   </p:cSld>
@@ -2845,7 +2470,7 @@
           <p:cNvPr id="2" name="Title 1">
             <a:extLst>
               <a:ext uri="{FF2B5EF4-FFF2-40B4-BE49-F238E27FC236}">
-                <a16:creationId xmlns:a16="http://schemas.microsoft.com/office/drawing/2014/main" id="{857C0653-6914-4F48-8794-E47DBFB96014}"/>
+                <a16:creationId xmlns:a16="http://schemas.microsoft.com/office/drawing/2014/main" id="{228869A3-8569-57FF-347F-2A8B109B75B5}"/>
               </a:ext>
             </a:extLst>
           </p:cNvPr>
@@ -2882,7 +2507,7 @@
           <p:cNvPr id="3" name="Picture Placeholder 2">
             <a:extLst>
               <a:ext uri="{FF2B5EF4-FFF2-40B4-BE49-F238E27FC236}">
-                <a16:creationId xmlns:a16="http://schemas.microsoft.com/office/drawing/2014/main" id="{FA067BB6-8995-3A4B-82B3-EA8C13ED7BFD}"/>
+                <a16:creationId xmlns:a16="http://schemas.microsoft.com/office/drawing/2014/main" id="{56FA5032-AC7D-DB29-CD4D-56089E87AC1D}"/>
               </a:ext>
             </a:extLst>
           </p:cNvPr>
@@ -2949,7 +2574,7 @@
           <p:cNvPr id="4" name="Text Placeholder 3">
             <a:extLst>
               <a:ext uri="{FF2B5EF4-FFF2-40B4-BE49-F238E27FC236}">
-                <a16:creationId xmlns:a16="http://schemas.microsoft.com/office/drawing/2014/main" id="{0AF09DD5-F5A1-2C4C-AD46-D8C53B763FD3}"/>
+                <a16:creationId xmlns:a16="http://schemas.microsoft.com/office/drawing/2014/main" id="{17F9B670-BB42-7D62-3092-C2A711CFD997}"/>
               </a:ext>
             </a:extLst>
           </p:cNvPr>
@@ -3020,7 +2645,7 @@
           <p:cNvPr id="5" name="Date Placeholder 4">
             <a:extLst>
               <a:ext uri="{FF2B5EF4-FFF2-40B4-BE49-F238E27FC236}">
-                <a16:creationId xmlns:a16="http://schemas.microsoft.com/office/drawing/2014/main" id="{6178533A-9268-A141-A98F-FADF6D0982A4}"/>
+                <a16:creationId xmlns:a16="http://schemas.microsoft.com/office/drawing/2014/main" id="{0D826B9B-90CA-96D4-BEE0-F21B342EE335}"/>
               </a:ext>
             </a:extLst>
           </p:cNvPr>
@@ -3036,9 +2661,9 @@
           <a:bodyPr/>
           <a:lstStyle/>
           <a:p>
-            <a:fld id="{DA2F9FC9-3FB7-7F46-83F3-21A28C7A694C}" type="datetimeFigureOut">
+            <a:fld id="{4803A9DE-CF9E-41A1-B23A-826744E0A338}" type="datetimeFigureOut">
               <a:rPr lang="en-US" smtClean="0"/>
-              <a:t>9/21/2023</a:t>
+              <a:t>5/21/2024</a:t>
             </a:fld>
             <a:endParaRPr lang="en-US"/>
           </a:p>
@@ -3049,7 +2674,7 @@
           <p:cNvPr id="6" name="Footer Placeholder 5">
             <a:extLst>
               <a:ext uri="{FF2B5EF4-FFF2-40B4-BE49-F238E27FC236}">
-                <a16:creationId xmlns:a16="http://schemas.microsoft.com/office/drawing/2014/main" id="{D7F543B8-E54E-9F4F-8C4C-60260E23E1ED}"/>
+                <a16:creationId xmlns:a16="http://schemas.microsoft.com/office/drawing/2014/main" id="{35E7F54B-80C3-A2EE-21E9-C8B3337C861E}"/>
               </a:ext>
             </a:extLst>
           </p:cNvPr>
@@ -3074,7 +2699,7 @@
           <p:cNvPr id="7" name="Slide Number Placeholder 6">
             <a:extLst>
               <a:ext uri="{FF2B5EF4-FFF2-40B4-BE49-F238E27FC236}">
-                <a16:creationId xmlns:a16="http://schemas.microsoft.com/office/drawing/2014/main" id="{48203636-1D7C-1C42-B202-62B52D290D1D}"/>
+                <a16:creationId xmlns:a16="http://schemas.microsoft.com/office/drawing/2014/main" id="{8B7BF7D1-5FD3-DB26-1F80-F2A47C5934F6}"/>
               </a:ext>
             </a:extLst>
           </p:cNvPr>
@@ -3090,7 +2715,7 @@
           <a:bodyPr/>
           <a:lstStyle/>
           <a:p>
-            <a:fld id="{949F184B-DAB7-9945-8324-3CF43A8B7D87}" type="slidenum">
+            <a:fld id="{3A72B03F-E2C0-4FB3-BA39-D9456EEE9B7B}" type="slidenum">
               <a:rPr lang="en-US" smtClean="0"/>
               <a:t>‹#›</a:t>
             </a:fld>
@@ -3101,7 +2726,7 @@
     </p:spTree>
     <p:extLst>
       <p:ext uri="{BB962C8B-B14F-4D97-AF65-F5344CB8AC3E}">
-        <p14:creationId xmlns:p14="http://schemas.microsoft.com/office/powerpoint/2010/main" val="3216787559"/>
+        <p14:creationId xmlns:p14="http://schemas.microsoft.com/office/powerpoint/2010/main" val="2261340298"/>
       </p:ext>
     </p:extLst>
   </p:cSld>
@@ -3138,7 +2763,7 @@
           <p:cNvPr id="2" name="Title Placeholder 1">
             <a:extLst>
               <a:ext uri="{FF2B5EF4-FFF2-40B4-BE49-F238E27FC236}">
-                <a16:creationId xmlns:a16="http://schemas.microsoft.com/office/drawing/2014/main" id="{F10600C5-1072-D544-A1E8-445F35A92357}"/>
+                <a16:creationId xmlns:a16="http://schemas.microsoft.com/office/drawing/2014/main" id="{A83A972A-AED1-0D98-71F8-735B743FAFEC}"/>
               </a:ext>
             </a:extLst>
           </p:cNvPr>
@@ -3176,7 +2801,7 @@
           <p:cNvPr id="3" name="Text Placeholder 2">
             <a:extLst>
               <a:ext uri="{FF2B5EF4-FFF2-40B4-BE49-F238E27FC236}">
-                <a16:creationId xmlns:a16="http://schemas.microsoft.com/office/drawing/2014/main" id="{D662FBE0-1D1F-1F4B-B2A2-C42467EDAA1A}"/>
+                <a16:creationId xmlns:a16="http://schemas.microsoft.com/office/drawing/2014/main" id="{70AB8C96-7717-3068-0E34-B415083B85A5}"/>
               </a:ext>
             </a:extLst>
           </p:cNvPr>
@@ -3243,7 +2868,7 @@
           <p:cNvPr id="4" name="Date Placeholder 3">
             <a:extLst>
               <a:ext uri="{FF2B5EF4-FFF2-40B4-BE49-F238E27FC236}">
-                <a16:creationId xmlns:a16="http://schemas.microsoft.com/office/drawing/2014/main" id="{91C6CB1D-FD6B-6A42-8D21-831DD6D13D57}"/>
+                <a16:creationId xmlns:a16="http://schemas.microsoft.com/office/drawing/2014/main" id="{FE8C5120-B1B4-A3C3-2468-E62BEBC52D73}"/>
               </a:ext>
             </a:extLst>
           </p:cNvPr>
@@ -3277,9 +2902,9 @@
             </a:lvl1pPr>
           </a:lstStyle>
           <a:p>
-            <a:fld id="{DA2F9FC9-3FB7-7F46-83F3-21A28C7A694C}" type="datetimeFigureOut">
+            <a:fld id="{4803A9DE-CF9E-41A1-B23A-826744E0A338}" type="datetimeFigureOut">
               <a:rPr lang="en-US" smtClean="0"/>
-              <a:t>9/21/2023</a:t>
+              <a:t>5/21/2024</a:t>
             </a:fld>
             <a:endParaRPr lang="en-US"/>
           </a:p>
@@ -3290,7 +2915,7 @@
           <p:cNvPr id="5" name="Footer Placeholder 4">
             <a:extLst>
               <a:ext uri="{FF2B5EF4-FFF2-40B4-BE49-F238E27FC236}">
-                <a16:creationId xmlns:a16="http://schemas.microsoft.com/office/drawing/2014/main" id="{B5584DA8-098A-9C46-A452-6E99A08B8166}"/>
+                <a16:creationId xmlns:a16="http://schemas.microsoft.com/office/drawing/2014/main" id="{D6633131-062F-E744-0959-D834BA7C5488}"/>
               </a:ext>
             </a:extLst>
           </p:cNvPr>
@@ -3333,7 +2958,7 @@
           <p:cNvPr id="6" name="Slide Number Placeholder 5">
             <a:extLst>
               <a:ext uri="{FF2B5EF4-FFF2-40B4-BE49-F238E27FC236}">
-                <a16:creationId xmlns:a16="http://schemas.microsoft.com/office/drawing/2014/main" id="{6AAF4D78-F9B5-C04A-9DD3-DA6C6B0AD7B8}"/>
+                <a16:creationId xmlns:a16="http://schemas.microsoft.com/office/drawing/2014/main" id="{E8480E9A-8EE0-0AF3-0508-AC06931BC85D}"/>
               </a:ext>
             </a:extLst>
           </p:cNvPr>
@@ -3367,7 +2992,7 @@
             </a:lvl1pPr>
           </a:lstStyle>
           <a:p>
-            <a:fld id="{949F184B-DAB7-9945-8324-3CF43A8B7D87}" type="slidenum">
+            <a:fld id="{3A72B03F-E2C0-4FB3-BA39-D9456EEE9B7B}" type="slidenum">
               <a:rPr lang="en-US" smtClean="0"/>
               <a:t>‹#›</a:t>
             </a:fld>
@@ -3375,40 +3000,10 @@
           </a:p>
         </p:txBody>
       </p:sp>
-      <p:pic>
-        <p:nvPicPr>
-          <p:cNvPr id="7" name="Picture 6" descr="Logo, company name&#10;&#10;Description automatically generated">
-            <a:extLst>
-              <a:ext uri="{FF2B5EF4-FFF2-40B4-BE49-F238E27FC236}">
-                <a16:creationId xmlns:a16="http://schemas.microsoft.com/office/drawing/2014/main" id="{5755C378-573A-BE41-BF37-698D83343605}"/>
-              </a:ext>
-            </a:extLst>
-          </p:cNvPr>
-          <p:cNvPicPr>
-            <a:picLocks noChangeAspect="1"/>
-          </p:cNvPicPr>
-          <p:nvPr userDrawn="1"/>
-        </p:nvPicPr>
-        <p:blipFill>
-          <a:blip r:embed="rId13"/>
-          <a:stretch>
-            <a:fillRect/>
-          </a:stretch>
-        </p:blipFill>
-        <p:spPr>
-          <a:xfrm>
-            <a:off x="10668000" y="182552"/>
-            <a:ext cx="1136998" cy="1186219"/>
-          </a:xfrm>
-          <a:prstGeom prst="rect">
-            <a:avLst/>
-          </a:prstGeom>
-        </p:spPr>
-      </p:pic>
     </p:spTree>
     <p:extLst>
       <p:ext uri="{BB962C8B-B14F-4D97-AF65-F5344CB8AC3E}">
-        <p14:creationId xmlns:p14="http://schemas.microsoft.com/office/powerpoint/2010/main" val="3794686101"/>
+        <p14:creationId xmlns:p14="http://schemas.microsoft.com/office/powerpoint/2010/main" val="494844556"/>
       </p:ext>
     </p:extLst>
   </p:cSld>
@@ -3731,7 +3326,7 @@
           <p:cNvPr id="2" name="Title 1">
             <a:extLst>
               <a:ext uri="{FF2B5EF4-FFF2-40B4-BE49-F238E27FC236}">
-                <a16:creationId xmlns:a16="http://schemas.microsoft.com/office/drawing/2014/main" id="{FDD5F7C7-2A7F-3043-9727-7B5DEC5AF75D}"/>
+                <a16:creationId xmlns:a16="http://schemas.microsoft.com/office/drawing/2014/main" id="{C99B271D-85AE-F412-8894-14EA26060CE6}"/>
               </a:ext>
             </a:extLst>
           </p:cNvPr>
@@ -3748,13 +3343,9 @@
           <a:lstStyle/>
           <a:p>
             <a:r>
-              <a:rPr lang="en-US" dirty="0"/>
-              <a:t>COMET DSMC Meeting</a:t>
-            </a:r>
-            <a:br>
-              <a:rPr lang="en-US" dirty="0"/>
-            </a:br>
-            <a:endParaRPr lang="en-US" dirty="0"/>
+              <a:rPr lang="en-US"/>
+              <a:t>DSM Report</a:t>
+            </a:r>
           </a:p>
         </p:txBody>
       </p:sp>
@@ -3763,7 +3354,7 @@
           <p:cNvPr id="3" name="Subtitle 2">
             <a:extLst>
               <a:ext uri="{FF2B5EF4-FFF2-40B4-BE49-F238E27FC236}">
-                <a16:creationId xmlns:a16="http://schemas.microsoft.com/office/drawing/2014/main" id="{11880061-00B2-1549-8A05-F66077D35FAB}"/>
+                <a16:creationId xmlns:a16="http://schemas.microsoft.com/office/drawing/2014/main" id="{28DD0883-6820-6B78-4C44-0211EA8BF3C0}"/>
               </a:ext>
             </a:extLst>
           </p:cNvPr>
@@ -3774,75 +3365,19 @@
             <p:ph type="subTitle" idx="1"/>
           </p:nvPr>
         </p:nvSpPr>
-        <p:spPr>
-          <a:xfrm>
-            <a:off x="1524000" y="3602037"/>
-            <a:ext cx="9144000" cy="2896733"/>
-          </a:xfrm>
-        </p:spPr>
-        <p:txBody>
-          <a:bodyPr>
-            <a:normAutofit/>
-          </a:bodyPr>
-          <a:lstStyle/>
-          <a:p>
-            <a:endParaRPr lang="en-US" dirty="0"/>
-          </a:p>
-          <a:p>
-            <a:endParaRPr lang="en-US" dirty="0"/>
-          </a:p>
-          <a:p>
-            <a:endParaRPr lang="en-US" dirty="0"/>
-          </a:p>
-          <a:p>
-            <a:r>
-              <a:rPr lang="en-US" sz="1800" dirty="0"/>
-              <a:t>R01 AG070036</a:t>
-            </a:r>
-          </a:p>
-          <a:p>
-            <a:r>
-              <a:rPr lang="en-US" sz="1800" dirty="0"/>
-              <a:t>NCT04848038</a:t>
-            </a:r>
-            <a:endParaRPr lang="en-US" dirty="0"/>
-          </a:p>
-        </p:txBody>
-      </p:sp>
-      <p:pic>
-        <p:nvPicPr>
-          <p:cNvPr id="4" name="Picture 4" descr="Logo, company name&#10;&#10;Description automatically generated">
-            <a:extLst>
-              <a:ext uri="{FF2B5EF4-FFF2-40B4-BE49-F238E27FC236}">
-                <a16:creationId xmlns:a16="http://schemas.microsoft.com/office/drawing/2014/main" id="{4683EEB5-8865-994B-A518-BADB790EDCD7}"/>
-              </a:ext>
-            </a:extLst>
-          </p:cNvPr>
-          <p:cNvPicPr>
-            <a:picLocks noChangeAspect="1"/>
-          </p:cNvPicPr>
-          <p:nvPr/>
-        </p:nvPicPr>
-        <p:blipFill>
-          <a:blip r:embed="rId2"/>
-          <a:stretch>
-            <a:fillRect/>
-          </a:stretch>
-        </p:blipFill>
-        <p:spPr>
-          <a:xfrm>
-            <a:off x="10847540" y="90478"/>
-            <a:ext cx="1136998" cy="1186219"/>
-          </a:xfrm>
-          <a:prstGeom prst="rect">
-            <a:avLst/>
-          </a:prstGeom>
-        </p:spPr>
-      </p:pic>
+        <p:spPr/>
+        <p:txBody>
+          <a:bodyPr/>
+          <a:lstStyle/>
+          <a:p>
+            <a:endParaRPr lang="en-US"/>
+          </a:p>
+        </p:txBody>
+      </p:sp>
     </p:spTree>
     <p:extLst>
       <p:ext uri="{BB962C8B-B14F-4D97-AF65-F5344CB8AC3E}">
-        <p14:creationId xmlns:p14="http://schemas.microsoft.com/office/powerpoint/2010/main" val="556516249"/>
+        <p14:creationId xmlns:p14="http://schemas.microsoft.com/office/powerpoint/2010/main" val="508317012"/>
       </p:ext>
     </p:extLst>
   </p:cSld>
@@ -4145,495 +3680,4 @@
     </a:ext>
   </a:extLst>
 </a:theme>
-</file>
-
-<file path=ppt/theme/theme2.xml><?xml version="1.0" encoding="utf-8"?>
-<a:theme xmlns:a="http://schemas.openxmlformats.org/drawingml/2006/main" name="Office Theme">
-  <a:themeElements>
-    <a:clrScheme name="Office">
-      <a:dk1>
-        <a:sysClr val="windowText" lastClr="000000"/>
-      </a:dk1>
-      <a:lt1>
-        <a:sysClr val="window" lastClr="FFFFFF"/>
-      </a:lt1>
-      <a:dk2>
-        <a:srgbClr val="44546A"/>
-      </a:dk2>
-      <a:lt2>
-        <a:srgbClr val="E7E6E6"/>
-      </a:lt2>
-      <a:accent1>
-        <a:srgbClr val="4472C4"/>
-      </a:accent1>
-      <a:accent2>
-        <a:srgbClr val="ED7D31"/>
-      </a:accent2>
-      <a:accent3>
-        <a:srgbClr val="A5A5A5"/>
-      </a:accent3>
-      <a:accent4>
-        <a:srgbClr val="FFC000"/>
-      </a:accent4>
-      <a:accent5>
-        <a:srgbClr val="5B9BD5"/>
-      </a:accent5>
-      <a:accent6>
-        <a:srgbClr val="70AD47"/>
-      </a:accent6>
-      <a:hlink>
-        <a:srgbClr val="0563C1"/>
-      </a:hlink>
-      <a:folHlink>
-        <a:srgbClr val="954F72"/>
-      </a:folHlink>
-    </a:clrScheme>
-    <a:fontScheme name="Office">
-      <a:majorFont>
-        <a:latin typeface="Calibri Light" panose="020F0302020204030204"/>
-        <a:ea typeface=""/>
-        <a:cs typeface=""/>
-        <a:font script="Jpan" typeface="游ゴシック Light"/>
-        <a:font script="Hang" typeface="맑은 고딕"/>
-        <a:font script="Hans" typeface="等线 Light"/>
-        <a:font script="Hant" typeface="新細明體"/>
-        <a:font script="Arab" typeface="Times New Roman"/>
-        <a:font script="Hebr" typeface="Times New Roman"/>
-        <a:font script="Thai" typeface="Angsana New"/>
-        <a:font script="Ethi" typeface="Nyala"/>
-        <a:font script="Beng" typeface="Vrinda"/>
-        <a:font script="Gujr" typeface="Shruti"/>
-        <a:font script="Khmr" typeface="MoolBoran"/>
-        <a:font script="Knda" typeface="Tunga"/>
-        <a:font script="Guru" typeface="Raavi"/>
-        <a:font script="Cans" typeface="Euphemia"/>
-        <a:font script="Cher" typeface="Plantagenet Cherokee"/>
-        <a:font script="Yiii" typeface="Microsoft Yi Baiti"/>
-        <a:font script="Tibt" typeface="Microsoft Himalaya"/>
-        <a:font script="Thaa" typeface="MV Boli"/>
-        <a:font script="Deva" typeface="Mangal"/>
-        <a:font script="Telu" typeface="Gautami"/>
-        <a:font script="Taml" typeface="Latha"/>
-        <a:font script="Syrc" typeface="Estrangelo Edessa"/>
-        <a:font script="Orya" typeface="Kalinga"/>
-        <a:font script="Mlym" typeface="Kartika"/>
-        <a:font script="Laoo" typeface="DokChampa"/>
-        <a:font script="Sinh" typeface="Iskoola Pota"/>
-        <a:font script="Mong" typeface="Mongolian Baiti"/>
-        <a:font script="Viet" typeface="Times New Roman"/>
-        <a:font script="Uigh" typeface="Microsoft Uighur"/>
-        <a:font script="Geor" typeface="Sylfaen"/>
-        <a:font script="Armn" typeface="Arial"/>
-        <a:font script="Bugi" typeface="Leelawadee UI"/>
-        <a:font script="Bopo" typeface="Microsoft JhengHei"/>
-        <a:font script="Java" typeface="Javanese Text"/>
-        <a:font script="Lisu" typeface="Segoe UI"/>
-        <a:font script="Mymr" typeface="Myanmar Text"/>
-        <a:font script="Nkoo" typeface="Ebrima"/>
-        <a:font script="Olck" typeface="Nirmala UI"/>
-        <a:font script="Osma" typeface="Ebrima"/>
-        <a:font script="Phag" typeface="Phagspa"/>
-        <a:font script="Syrn" typeface="Estrangelo Edessa"/>
-        <a:font script="Syrj" typeface="Estrangelo Edessa"/>
-        <a:font script="Syre" typeface="Estrangelo Edessa"/>
-        <a:font script="Sora" typeface="Nirmala UI"/>
-        <a:font script="Tale" typeface="Microsoft Tai Le"/>
-        <a:font script="Talu" typeface="Microsoft New Tai Lue"/>
-        <a:font script="Tfng" typeface="Ebrima"/>
-      </a:majorFont>
-      <a:minorFont>
-        <a:latin typeface="Calibri" panose="020F0502020204030204"/>
-        <a:ea typeface=""/>
-        <a:cs typeface=""/>
-        <a:font script="Jpan" typeface="游ゴシック"/>
-        <a:font script="Hang" typeface="맑은 고딕"/>
-        <a:font script="Hans" typeface="等线"/>
-        <a:font script="Hant" typeface="新細明體"/>
-        <a:font script="Arab" typeface="Arial"/>
-        <a:font script="Hebr" typeface="Arial"/>
-        <a:font script="Thai" typeface="Cordia New"/>
-        <a:font script="Ethi" typeface="Nyala"/>
-        <a:font script="Beng" typeface="Vrinda"/>
-        <a:font script="Gujr" typeface="Shruti"/>
-        <a:font script="Khmr" typeface="DaunPenh"/>
-        <a:font script="Knda" typeface="Tunga"/>
-        <a:font script="Guru" typeface="Raavi"/>
-        <a:font script="Cans" typeface="Euphemia"/>
-        <a:font script="Cher" typeface="Plantagenet Cherokee"/>
-        <a:font script="Yiii" typeface="Microsoft Yi Baiti"/>
-        <a:font script="Tibt" typeface="Microsoft Himalaya"/>
-        <a:font script="Thaa" typeface="MV Boli"/>
-        <a:font script="Deva" typeface="Mangal"/>
-        <a:font script="Telu" typeface="Gautami"/>
-        <a:font script="Taml" typeface="Latha"/>
-        <a:font script="Syrc" typeface="Estrangelo Edessa"/>
-        <a:font script="Orya" typeface="Kalinga"/>
-        <a:font script="Mlym" typeface="Kartika"/>
-        <a:font script="Laoo" typeface="DokChampa"/>
-        <a:font script="Sinh" typeface="Iskoola Pota"/>
-        <a:font script="Mong" typeface="Mongolian Baiti"/>
-        <a:font script="Viet" typeface="Arial"/>
-        <a:font script="Uigh" typeface="Microsoft Uighur"/>
-        <a:font script="Geor" typeface="Sylfaen"/>
-        <a:font script="Armn" typeface="Arial"/>
-        <a:font script="Bugi" typeface="Leelawadee UI"/>
-        <a:font script="Bopo" typeface="Microsoft JhengHei"/>
-        <a:font script="Java" typeface="Javanese Text"/>
-        <a:font script="Lisu" typeface="Segoe UI"/>
-        <a:font script="Mymr" typeface="Myanmar Text"/>
-        <a:font script="Nkoo" typeface="Ebrima"/>
-        <a:font script="Olck" typeface="Nirmala UI"/>
-        <a:font script="Osma" typeface="Ebrima"/>
-        <a:font script="Phag" typeface="Phagspa"/>
-        <a:font script="Syrn" typeface="Estrangelo Edessa"/>
-        <a:font script="Syrj" typeface="Estrangelo Edessa"/>
-        <a:font script="Syre" typeface="Estrangelo Edessa"/>
-        <a:font script="Sora" typeface="Nirmala UI"/>
-        <a:font script="Tale" typeface="Microsoft Tai Le"/>
-        <a:font script="Talu" typeface="Microsoft New Tai Lue"/>
-        <a:font script="Tfng" typeface="Ebrima"/>
-      </a:minorFont>
-    </a:fontScheme>
-    <a:fmtScheme name="Office">
-      <a:fillStyleLst>
-        <a:solidFill>
-          <a:schemeClr val="phClr"/>
-        </a:solidFill>
-        <a:gradFill rotWithShape="1">
-          <a:gsLst>
-            <a:gs pos="0">
-              <a:schemeClr val="phClr">
-                <a:lumMod val="110000"/>
-                <a:satMod val="105000"/>
-                <a:tint val="67000"/>
-              </a:schemeClr>
-            </a:gs>
-            <a:gs pos="50000">
-              <a:schemeClr val="phClr">
-                <a:lumMod val="105000"/>
-                <a:satMod val="103000"/>
-                <a:tint val="73000"/>
-              </a:schemeClr>
-            </a:gs>
-            <a:gs pos="100000">
-              <a:schemeClr val="phClr">
-                <a:lumMod val="105000"/>
-                <a:satMod val="109000"/>
-                <a:tint val="81000"/>
-              </a:schemeClr>
-            </a:gs>
-          </a:gsLst>
-          <a:lin ang="5400000" scaled="0"/>
-        </a:gradFill>
-        <a:gradFill rotWithShape="1">
-          <a:gsLst>
-            <a:gs pos="0">
-              <a:schemeClr val="phClr">
-                <a:satMod val="103000"/>
-                <a:lumMod val="102000"/>
-                <a:tint val="94000"/>
-              </a:schemeClr>
-            </a:gs>
-            <a:gs pos="50000">
-              <a:schemeClr val="phClr">
-                <a:satMod val="110000"/>
-                <a:lumMod val="100000"/>
-                <a:shade val="100000"/>
-              </a:schemeClr>
-            </a:gs>
-            <a:gs pos="100000">
-              <a:schemeClr val="phClr">
-                <a:lumMod val="99000"/>
-                <a:satMod val="120000"/>
-                <a:shade val="78000"/>
-              </a:schemeClr>
-            </a:gs>
-          </a:gsLst>
-          <a:lin ang="5400000" scaled="0"/>
-        </a:gradFill>
-      </a:fillStyleLst>
-      <a:lnStyleLst>
-        <a:ln w="6350" cap="flat" cmpd="sng" algn="ctr">
-          <a:solidFill>
-            <a:schemeClr val="phClr"/>
-          </a:solidFill>
-          <a:prstDash val="solid"/>
-          <a:miter lim="800000"/>
-        </a:ln>
-        <a:ln w="12700" cap="flat" cmpd="sng" algn="ctr">
-          <a:solidFill>
-            <a:schemeClr val="phClr"/>
-          </a:solidFill>
-          <a:prstDash val="solid"/>
-          <a:miter lim="800000"/>
-        </a:ln>
-        <a:ln w="19050" cap="flat" cmpd="sng" algn="ctr">
-          <a:solidFill>
-            <a:schemeClr val="phClr"/>
-          </a:solidFill>
-          <a:prstDash val="solid"/>
-          <a:miter lim="800000"/>
-        </a:ln>
-      </a:lnStyleLst>
-      <a:effectStyleLst>
-        <a:effectStyle>
-          <a:effectLst/>
-        </a:effectStyle>
-        <a:effectStyle>
-          <a:effectLst/>
-        </a:effectStyle>
-        <a:effectStyle>
-          <a:effectLst>
-            <a:outerShdw blurRad="57150" dist="19050" dir="5400000" algn="ctr" rotWithShape="0">
-              <a:srgbClr val="000000">
-                <a:alpha val="63000"/>
-              </a:srgbClr>
-            </a:outerShdw>
-          </a:effectLst>
-        </a:effectStyle>
-      </a:effectStyleLst>
-      <a:bgFillStyleLst>
-        <a:solidFill>
-          <a:schemeClr val="phClr"/>
-        </a:solidFill>
-        <a:solidFill>
-          <a:schemeClr val="phClr">
-            <a:tint val="95000"/>
-            <a:satMod val="170000"/>
-          </a:schemeClr>
-        </a:solidFill>
-        <a:gradFill rotWithShape="1">
-          <a:gsLst>
-            <a:gs pos="0">
-              <a:schemeClr val="phClr">
-                <a:tint val="93000"/>
-                <a:satMod val="150000"/>
-                <a:shade val="98000"/>
-                <a:lumMod val="102000"/>
-              </a:schemeClr>
-            </a:gs>
-            <a:gs pos="50000">
-              <a:schemeClr val="phClr">
-                <a:tint val="98000"/>
-                <a:satMod val="130000"/>
-                <a:shade val="90000"/>
-                <a:lumMod val="103000"/>
-              </a:schemeClr>
-            </a:gs>
-            <a:gs pos="100000">
-              <a:schemeClr val="phClr">
-                <a:shade val="63000"/>
-                <a:satMod val="120000"/>
-              </a:schemeClr>
-            </a:gs>
-          </a:gsLst>
-          <a:lin ang="5400000" scaled="0"/>
-        </a:gradFill>
-      </a:bgFillStyleLst>
-    </a:fmtScheme>
-  </a:themeElements>
-  <a:objectDefaults/>
-  <a:extraClrSchemeLst/>
-  <a:extLst>
-    <a:ext uri="{05A4C25C-085E-4340-85A3-A5531E510DB2}">
-      <thm15:themeFamily xmlns:thm15="http://schemas.microsoft.com/office/thememl/2012/main" name="Office Theme" id="{62F939B6-93AF-4DB8-9C6B-D6C7DFDC589F}" vid="{4A3C46E8-61CC-4603-A589-7422A47A8E4A}"/>
-    </a:ext>
-  </a:extLst>
-</a:theme>
-</file>
-
-<file path=customXml/item1.xml><?xml version="1.0" encoding="utf-8"?>
-<p:properties xmlns:p="http://schemas.microsoft.com/office/2006/metadata/properties" xmlns:xsi="http://www.w3.org/2001/XMLSchema-instance" xmlns:pc="http://schemas.microsoft.com/office/infopath/2007/PartnerControls">
-  <documentManagement/>
-</p:properties>
-</file>
-
-<file path=customXml/item2.xml><?xml version="1.0" encoding="utf-8"?>
-<ct:contentTypeSchema xmlns:ct="http://schemas.microsoft.com/office/2006/metadata/contentType" xmlns:ma="http://schemas.microsoft.com/office/2006/metadata/properties/metaAttributes" ct:_="" ma:_="" ma:contentTypeName="Document" ma:contentTypeID="0x01010043E06F88C697B34C9E3C30EB1498CFB4" ma:contentTypeVersion="4" ma:contentTypeDescription="Create a new document." ma:contentTypeScope="" ma:versionID="5b9134bfc7494bcb2806e6ef8a7e4764">
-  <xsd:schema xmlns:xsd="http://www.w3.org/2001/XMLSchema" xmlns:xs="http://www.w3.org/2001/XMLSchema" xmlns:p="http://schemas.microsoft.com/office/2006/metadata/properties" xmlns:ns2="9a7a471e-8910-4aff-b861-c777a123c081" targetNamespace="http://schemas.microsoft.com/office/2006/metadata/properties" ma:root="true" ma:fieldsID="01375db28e2104835fbe56fea9e30aa0" ns2:_="">
-    <xsd:import namespace="9a7a471e-8910-4aff-b861-c777a123c081"/>
-    <xsd:element name="properties">
-      <xsd:complexType>
-        <xsd:sequence>
-          <xsd:element name="documentManagement">
-            <xsd:complexType>
-              <xsd:all>
-                <xsd:element ref="ns2:MediaServiceMetadata" minOccurs="0"/>
-                <xsd:element ref="ns2:MediaServiceFastMetadata" minOccurs="0"/>
-                <xsd:element ref="ns2:MediaServiceAutoKeyPoints" minOccurs="0"/>
-                <xsd:element ref="ns2:MediaServiceKeyPoints" minOccurs="0"/>
-              </xsd:all>
-            </xsd:complexType>
-          </xsd:element>
-        </xsd:sequence>
-      </xsd:complexType>
-    </xsd:element>
-  </xsd:schema>
-  <xsd:schema xmlns:xsd="http://www.w3.org/2001/XMLSchema" xmlns:xs="http://www.w3.org/2001/XMLSchema" xmlns:dms="http://schemas.microsoft.com/office/2006/documentManagement/types" xmlns:pc="http://schemas.microsoft.com/office/infopath/2007/PartnerControls" targetNamespace="9a7a471e-8910-4aff-b861-c777a123c081" elementFormDefault="qualified">
-    <xsd:import namespace="http://schemas.microsoft.com/office/2006/documentManagement/types"/>
-    <xsd:import namespace="http://schemas.microsoft.com/office/infopath/2007/PartnerControls"/>
-    <xsd:element name="MediaServiceMetadata" ma:index="8" nillable="true" ma:displayName="MediaServiceMetadata" ma:hidden="true" ma:internalName="MediaServiceMetadata" ma:readOnly="true">
-      <xsd:simpleType>
-        <xsd:restriction base="dms:Note"/>
-      </xsd:simpleType>
-    </xsd:element>
-    <xsd:element name="MediaServiceFastMetadata" ma:index="9" nillable="true" ma:displayName="MediaServiceFastMetadata" ma:hidden="true" ma:internalName="MediaServiceFastMetadata" ma:readOnly="true">
-      <xsd:simpleType>
-        <xsd:restriction base="dms:Note"/>
-      </xsd:simpleType>
-    </xsd:element>
-    <xsd:element name="MediaServiceAutoKeyPoints" ma:index="10" nillable="true" ma:displayName="MediaServiceAutoKeyPoints" ma:hidden="true" ma:internalName="MediaServiceAutoKeyPoints" ma:readOnly="true">
-      <xsd:simpleType>
-        <xsd:restriction base="dms:Note"/>
-      </xsd:simpleType>
-    </xsd:element>
-    <xsd:element name="MediaServiceKeyPoints" ma:index="11" nillable="true" ma:displayName="KeyPoints" ma:internalName="MediaServiceKeyPoints" ma:readOnly="true">
-      <xsd:simpleType>
-        <xsd:restriction base="dms:Note">
-          <xsd:maxLength value="255"/>
-        </xsd:restriction>
-      </xsd:simpleType>
-    </xsd:element>
-  </xsd:schema>
-  <xsd:schema xmlns="http://schemas.openxmlformats.org/package/2006/metadata/core-properties" xmlns:xsd="http://www.w3.org/2001/XMLSchema" xmlns:xsi="http://www.w3.org/2001/XMLSchema-instance" xmlns:dc="http://purl.org/dc/elements/1.1/" xmlns:dcterms="http://purl.org/dc/terms/" xmlns:odoc="http://schemas.microsoft.com/internal/obd" targetNamespace="http://schemas.openxmlformats.org/package/2006/metadata/core-properties" elementFormDefault="qualified" attributeFormDefault="unqualified" blockDefault="#all">
-    <xsd:import namespace="http://purl.org/dc/elements/1.1/" schemaLocation="http://dublincore.org/schemas/xmls/qdc/2003/04/02/dc.xsd"/>
-    <xsd:import namespace="http://purl.org/dc/terms/" schemaLocation="http://dublincore.org/schemas/xmls/qdc/2003/04/02/dcterms.xsd"/>
-    <xsd:element name="coreProperties" type="CT_coreProperties"/>
-    <xsd:complexType name="CT_coreProperties">
-      <xsd:all>
-        <xsd:element ref="dc:creator" minOccurs="0" maxOccurs="1"/>
-        <xsd:element ref="dcterms:created" minOccurs="0" maxOccurs="1"/>
-        <xsd:element ref="dc:identifier" minOccurs="0" maxOccurs="1"/>
-        <xsd:element name="contentType" minOccurs="0" maxOccurs="1" type="xsd:string" ma:index="0" ma:displayName="Content Type"/>
-        <xsd:element ref="dc:title" minOccurs="0" maxOccurs="1" ma:index="4" ma:displayName="Title"/>
-        <xsd:element ref="dc:subject" minOccurs="0" maxOccurs="1"/>
-        <xsd:element ref="dc:description" minOccurs="0" maxOccurs="1"/>
-        <xsd:element name="keywords" minOccurs="0" maxOccurs="1" type="xsd:string"/>
-        <xsd:element ref="dc:language" minOccurs="0" maxOccurs="1"/>
-        <xsd:element name="category" minOccurs="0" maxOccurs="1" type="xsd:string"/>
-        <xsd:element name="version" minOccurs="0" maxOccurs="1" type="xsd:string"/>
-        <xsd:element name="revision" minOccurs="0" maxOccurs="1" type="xsd:string">
-          <xsd:annotation>
-            <xsd:documentation>
-                        This value indicates the number of saves or revisions. The application is responsible for updating this value after each revision.
-                    </xsd:documentation>
-          </xsd:annotation>
-        </xsd:element>
-        <xsd:element name="lastModifiedBy" minOccurs="0" maxOccurs="1" type="xsd:string"/>
-        <xsd:element ref="dcterms:modified" minOccurs="0" maxOccurs="1"/>
-        <xsd:element name="contentStatus" minOccurs="0" maxOccurs="1" type="xsd:string"/>
-      </xsd:all>
-    </xsd:complexType>
-  </xsd:schema>
-  <xs:schema xmlns:pc="http://schemas.microsoft.com/office/infopath/2007/PartnerControls" xmlns:xs="http://www.w3.org/2001/XMLSchema" targetNamespace="http://schemas.microsoft.com/office/infopath/2007/PartnerControls" elementFormDefault="qualified" attributeFormDefault="unqualified">
-    <xs:element name="Person">
-      <xs:complexType>
-        <xs:sequence>
-          <xs:element ref="pc:DisplayName" minOccurs="0"/>
-          <xs:element ref="pc:AccountId" minOccurs="0"/>
-          <xs:element ref="pc:AccountType" minOccurs="0"/>
-        </xs:sequence>
-      </xs:complexType>
-    </xs:element>
-    <xs:element name="DisplayName" type="xs:string"/>
-    <xs:element name="AccountId" type="xs:string"/>
-    <xs:element name="AccountType" type="xs:string"/>
-    <xs:element name="BDCAssociatedEntity">
-      <xs:complexType>
-        <xs:sequence>
-          <xs:element ref="pc:BDCEntity" minOccurs="0" maxOccurs="unbounded"/>
-        </xs:sequence>
-        <xs:attribute ref="pc:EntityNamespace"/>
-        <xs:attribute ref="pc:EntityName"/>
-        <xs:attribute ref="pc:SystemInstanceName"/>
-        <xs:attribute ref="pc:AssociationName"/>
-      </xs:complexType>
-    </xs:element>
-    <xs:attribute name="EntityNamespace" type="xs:string"/>
-    <xs:attribute name="EntityName" type="xs:string"/>
-    <xs:attribute name="SystemInstanceName" type="xs:string"/>
-    <xs:attribute name="AssociationName" type="xs:string"/>
-    <xs:element name="BDCEntity">
-      <xs:complexType>
-        <xs:sequence>
-          <xs:element ref="pc:EntityDisplayName" minOccurs="0"/>
-          <xs:element ref="pc:EntityInstanceReference" minOccurs="0"/>
-          <xs:element ref="pc:EntityId1" minOccurs="0"/>
-          <xs:element ref="pc:EntityId2" minOccurs="0"/>
-          <xs:element ref="pc:EntityId3" minOccurs="0"/>
-          <xs:element ref="pc:EntityId4" minOccurs="0"/>
-          <xs:element ref="pc:EntityId5" minOccurs="0"/>
-        </xs:sequence>
-      </xs:complexType>
-    </xs:element>
-    <xs:element name="EntityDisplayName" type="xs:string"/>
-    <xs:element name="EntityInstanceReference" type="xs:string"/>
-    <xs:element name="EntityId1" type="xs:string"/>
-    <xs:element name="EntityId2" type="xs:string"/>
-    <xs:element name="EntityId3" type="xs:string"/>
-    <xs:element name="EntityId4" type="xs:string"/>
-    <xs:element name="EntityId5" type="xs:string"/>
-    <xs:element name="Terms">
-      <xs:complexType>
-        <xs:sequence>
-          <xs:element ref="pc:TermInfo" minOccurs="0" maxOccurs="unbounded"/>
-        </xs:sequence>
-      </xs:complexType>
-    </xs:element>
-    <xs:element name="TermInfo">
-      <xs:complexType>
-        <xs:sequence>
-          <xs:element ref="pc:TermName" minOccurs="0"/>
-          <xs:element ref="pc:TermId" minOccurs="0"/>
-        </xs:sequence>
-      </xs:complexType>
-    </xs:element>
-    <xs:element name="TermName" type="xs:string"/>
-    <xs:element name="TermId" type="xs:string"/>
-  </xs:schema>
-</ct:contentTypeSchema>
-</file>
-
-<file path=customXml/item3.xml><?xml version="1.0" encoding="utf-8"?>
-<?mso-contentType ?>
-<FormTemplates xmlns="http://schemas.microsoft.com/sharepoint/v3/contenttype/forms">
-  <Display>DocumentLibraryForm</Display>
-  <Edit>DocumentLibraryForm</Edit>
-  <New>DocumentLibraryForm</New>
-</FormTemplates>
-</file>
-
-<file path=customXml/itemProps1.xml><?xml version="1.0" encoding="utf-8"?>
-<ds:datastoreItem xmlns:ds="http://schemas.openxmlformats.org/officeDocument/2006/customXml" ds:itemID="{765B9F08-CA21-43E8-9F90-485A3E812894}">
-  <ds:schemaRefs>
-    <ds:schemaRef ds:uri="http://schemas.microsoft.com/office/2006/metadata/properties"/>
-    <ds:schemaRef ds:uri="http://schemas.microsoft.com/office/infopath/2007/PartnerControls"/>
-  </ds:schemaRefs>
-</ds:datastoreItem>
-</file>
-
-<file path=customXml/itemProps2.xml><?xml version="1.0" encoding="utf-8"?>
-<ds:datastoreItem xmlns:ds="http://schemas.openxmlformats.org/officeDocument/2006/customXml" ds:itemID="{039CE707-4DED-46A0-B64D-EF8F9D48E540}">
-  <ds:schemaRefs>
-    <ds:schemaRef ds:uri="9a7a471e-8910-4aff-b861-c777a123c081"/>
-    <ds:schemaRef ds:uri="http://purl.org/dc/elements/1.1/"/>
-    <ds:schemaRef ds:uri="http://purl.org/dc/terms/"/>
-    <ds:schemaRef ds:uri="http://schemas.microsoft.com/internal/obd"/>
-    <ds:schemaRef ds:uri="http://schemas.microsoft.com/office/2006/documentManagement/types"/>
-    <ds:schemaRef ds:uri="http://schemas.microsoft.com/office/2006/metadata/contentType"/>
-    <ds:schemaRef ds:uri="http://schemas.microsoft.com/office/2006/metadata/properties"/>
-    <ds:schemaRef ds:uri="http://schemas.microsoft.com/office/2006/metadata/properties/metaAttributes"/>
-    <ds:schemaRef ds:uri="http://schemas.microsoft.com/office/infopath/2007/PartnerControls"/>
-    <ds:schemaRef ds:uri="http://schemas.openxmlformats.org/package/2006/metadata/core-properties"/>
-    <ds:schemaRef ds:uri="http://www.w3.org/2001/XMLSchema"/>
-  </ds:schemaRefs>
-</ds:datastoreItem>
-</file>
-
-<file path=customXml/itemProps3.xml><?xml version="1.0" encoding="utf-8"?>
-<ds:datastoreItem xmlns:ds="http://schemas.openxmlformats.org/officeDocument/2006/customXml" ds:itemID="{1EE448C3-7790-4B29-A487-3B82AE16A9EF}">
-  <ds:schemaRefs>
-    <ds:schemaRef ds:uri="http://schemas.microsoft.com/sharepoint/v3/contenttype/forms"/>
-  </ds:schemaRefs>
-</ds:datastoreItem>
 </file>
</xml_diff>